<commit_message>
Updated dataflow from Alex.
</commit_message>
<xml_diff>
--- a/2015_DOE_Review/Dataflow.pptx
+++ b/2015_DOE_Review/Dataflow.pptx
@@ -9,18 +9,18 @@
   </p:notesMasterIdLst>
   <p:sldIdLst>
     <p:sldId id="261" r:id="rId2"/>
-    <p:sldId id="262" r:id="rId3"/>
-    <p:sldId id="271" r:id="rId4"/>
-    <p:sldId id="263" r:id="rId5"/>
-    <p:sldId id="258" r:id="rId6"/>
-    <p:sldId id="264" r:id="rId7"/>
-    <p:sldId id="265" r:id="rId8"/>
+    <p:sldId id="271" r:id="rId3"/>
+    <p:sldId id="263" r:id="rId4"/>
+    <p:sldId id="258" r:id="rId5"/>
+    <p:sldId id="264" r:id="rId6"/>
+    <p:sldId id="265" r:id="rId7"/>
+    <p:sldId id="274" r:id="rId8"/>
     <p:sldId id="266" r:id="rId9"/>
     <p:sldId id="267" r:id="rId10"/>
-    <p:sldId id="272" r:id="rId11"/>
-    <p:sldId id="268" r:id="rId12"/>
-    <p:sldId id="269" r:id="rId13"/>
-    <p:sldId id="270" r:id="rId14"/>
+    <p:sldId id="268" r:id="rId11"/>
+    <p:sldId id="269" r:id="rId12"/>
+    <p:sldId id="270" r:id="rId13"/>
+    <p:sldId id="275" r:id="rId14"/>
   </p:sldIdLst>
   <p:sldSz cx="9144000" cy="6858000" type="screen4x3"/>
   <p:notesSz cx="6858000" cy="9144000"/>
@@ -3607,745 +3607,6 @@
       </p:grpSpPr>
       <p:sp>
         <p:nvSpPr>
-          <p:cNvPr id="2" name="Title 1"/>
-          <p:cNvSpPr>
-            <a:spLocks noGrp="1"/>
-          </p:cNvSpPr>
-          <p:nvPr>
-            <p:ph type="title"/>
-          </p:nvPr>
-        </p:nvSpPr>
-        <p:spPr/>
-        <p:txBody>
-          <a:bodyPr/>
-          <a:lstStyle/>
-          <a:p>
-            <a:r>
-              <a:rPr lang="en-US" dirty="0" smtClean="0"/>
-              <a:t>GEM data flow </a:t>
-            </a:r>
-            <a:r>
-              <a:rPr lang="en-US" dirty="0" err="1" smtClean="0"/>
-              <a:t>GEp</a:t>
-            </a:r>
-            <a:endParaRPr lang="en-US" dirty="0"/>
-          </a:p>
-        </p:txBody>
-      </p:sp>
-      <p:sp>
-        <p:nvSpPr>
-          <p:cNvPr id="4" name="TextBox 3"/>
-          <p:cNvSpPr txBox="1"/>
-          <p:nvPr/>
-        </p:nvSpPr>
-        <p:spPr>
-          <a:xfrm>
-            <a:off x="221776" y="2776182"/>
-            <a:ext cx="1143000" cy="923330"/>
-          </a:xfrm>
-          <a:prstGeom prst="rect">
-            <a:avLst/>
-          </a:prstGeom>
-          <a:noFill/>
-          <a:ln>
-            <a:solidFill>
-              <a:schemeClr val="tx1"/>
-            </a:solidFill>
-          </a:ln>
-        </p:spPr>
-        <p:txBody>
-          <a:bodyPr wrap="square" rtlCol="0">
-            <a:spAutoFit/>
-          </a:bodyPr>
-          <a:lstStyle/>
-          <a:p>
-            <a:pPr algn="ctr"/>
-            <a:r>
-              <a:rPr lang="en-US" dirty="0" smtClean="0"/>
-              <a:t>GEM</a:t>
-            </a:r>
-          </a:p>
-          <a:p>
-            <a:pPr algn="ctr"/>
-            <a:r>
-              <a:rPr lang="en-US" dirty="0" smtClean="0"/>
-              <a:t>112 640</a:t>
-            </a:r>
-          </a:p>
-          <a:p>
-            <a:pPr algn="ctr"/>
-            <a:r>
-              <a:rPr lang="en-US" dirty="0" smtClean="0"/>
-              <a:t>strips</a:t>
-            </a:r>
-            <a:r>
-              <a:rPr lang="en-US" dirty="0" smtClean="0"/>
-              <a:t> </a:t>
-            </a:r>
-            <a:endParaRPr lang="en-US" dirty="0" smtClean="0"/>
-          </a:p>
-        </p:txBody>
-      </p:sp>
-      <p:sp>
-        <p:nvSpPr>
-          <p:cNvPr id="5" name="Right Arrow 4"/>
-          <p:cNvSpPr/>
-          <p:nvPr/>
-        </p:nvSpPr>
-        <p:spPr>
-          <a:xfrm>
-            <a:off x="1447800" y="3047347"/>
-            <a:ext cx="914400" cy="381000"/>
-          </a:xfrm>
-          <a:prstGeom prst="rightArrow">
-            <a:avLst/>
-          </a:prstGeom>
-        </p:spPr>
-        <p:style>
-          <a:lnRef idx="2">
-            <a:schemeClr val="accent1">
-              <a:shade val="50000"/>
-            </a:schemeClr>
-          </a:lnRef>
-          <a:fillRef idx="1">
-            <a:schemeClr val="accent1"/>
-          </a:fillRef>
-          <a:effectRef idx="0">
-            <a:schemeClr val="accent1"/>
-          </a:effectRef>
-          <a:fontRef idx="minor">
-            <a:schemeClr val="lt1"/>
-          </a:fontRef>
-        </p:style>
-        <p:txBody>
-          <a:bodyPr rtlCol="0" anchor="ctr"/>
-          <a:lstStyle/>
-          <a:p>
-            <a:pPr algn="ctr"/>
-            <a:endParaRPr lang="en-US"/>
-          </a:p>
-        </p:txBody>
-      </p:sp>
-      <p:sp>
-        <p:nvSpPr>
-          <p:cNvPr id="7" name="TextBox 6"/>
-          <p:cNvSpPr txBox="1"/>
-          <p:nvPr/>
-        </p:nvSpPr>
-        <p:spPr>
-          <a:xfrm>
-            <a:off x="2362200" y="2165361"/>
-            <a:ext cx="1143000" cy="2031325"/>
-          </a:xfrm>
-          <a:prstGeom prst="rect">
-            <a:avLst/>
-          </a:prstGeom>
-          <a:noFill/>
-          <a:ln>
-            <a:solidFill>
-              <a:schemeClr val="tx1"/>
-            </a:solidFill>
-          </a:ln>
-        </p:spPr>
-        <p:txBody>
-          <a:bodyPr wrap="square" rtlCol="0">
-            <a:spAutoFit/>
-          </a:bodyPr>
-          <a:lstStyle/>
-          <a:p>
-            <a:pPr algn="ctr"/>
-            <a:r>
-              <a:rPr lang="en-US" dirty="0" smtClean="0"/>
-              <a:t>MPD</a:t>
-            </a:r>
-          </a:p>
-          <a:p>
-            <a:pPr algn="ctr"/>
-            <a:r>
-              <a:rPr lang="en-US" dirty="0" smtClean="0"/>
-              <a:t>112 640</a:t>
-            </a:r>
-          </a:p>
-          <a:p>
-            <a:pPr algn="ctr"/>
-            <a:r>
-              <a:rPr lang="en-US" dirty="0" smtClean="0"/>
-              <a:t>X 6 samples x 3 bytes</a:t>
-            </a:r>
-          </a:p>
-          <a:p>
-            <a:pPr algn="ctr"/>
-            <a:r>
-              <a:rPr lang="en-US" dirty="0" smtClean="0"/>
-              <a:t>= 13 .8 GB/s</a:t>
-            </a:r>
-          </a:p>
-        </p:txBody>
-      </p:sp>
-      <p:sp>
-        <p:nvSpPr>
-          <p:cNvPr id="8" name="TextBox 7"/>
-          <p:cNvSpPr txBox="1"/>
-          <p:nvPr/>
-        </p:nvSpPr>
-        <p:spPr>
-          <a:xfrm>
-            <a:off x="3653297" y="1355256"/>
-            <a:ext cx="1813766" cy="369332"/>
-          </a:xfrm>
-          <a:prstGeom prst="rect">
-            <a:avLst/>
-          </a:prstGeom>
-          <a:noFill/>
-          <a:ln>
-            <a:solidFill>
-              <a:schemeClr val="tx1"/>
-            </a:solidFill>
-          </a:ln>
-        </p:spPr>
-        <p:txBody>
-          <a:bodyPr wrap="none" rtlCol="0">
-            <a:spAutoFit/>
-          </a:bodyPr>
-          <a:lstStyle/>
-          <a:p>
-            <a:pPr algn="ctr"/>
-            <a:r>
-              <a:rPr lang="en-US" dirty="0" smtClean="0"/>
-              <a:t>5 KHz trigger rate</a:t>
-            </a:r>
-            <a:endParaRPr lang="en-US" dirty="0" smtClean="0"/>
-          </a:p>
-        </p:txBody>
-      </p:sp>
-      <p:sp>
-        <p:nvSpPr>
-          <p:cNvPr id="10" name="TextBox 9"/>
-          <p:cNvSpPr txBox="1"/>
-          <p:nvPr/>
-        </p:nvSpPr>
-        <p:spPr>
-          <a:xfrm>
-            <a:off x="3962400" y="2165360"/>
-            <a:ext cx="1600200" cy="2031325"/>
-          </a:xfrm>
-          <a:prstGeom prst="rect">
-            <a:avLst/>
-          </a:prstGeom>
-          <a:noFill/>
-          <a:ln>
-            <a:solidFill>
-              <a:schemeClr val="tx1"/>
-            </a:solidFill>
-          </a:ln>
-        </p:spPr>
-        <p:txBody>
-          <a:bodyPr wrap="square" rtlCol="0">
-            <a:spAutoFit/>
-          </a:bodyPr>
-          <a:lstStyle/>
-          <a:p>
-            <a:pPr algn="ctr"/>
-            <a:r>
-              <a:rPr lang="en-US" dirty="0" smtClean="0"/>
-              <a:t>MPD</a:t>
-            </a:r>
-          </a:p>
-          <a:p>
-            <a:pPr algn="ctr"/>
-            <a:r>
-              <a:rPr lang="en-US" dirty="0" smtClean="0"/>
-              <a:t>Zero suppress</a:t>
-            </a:r>
-          </a:p>
-          <a:p>
-            <a:pPr algn="ctr"/>
-            <a:r>
-              <a:rPr lang="en-US" dirty="0" smtClean="0"/>
-              <a:t>Geometrical cut (factor 3)</a:t>
-            </a:r>
-          </a:p>
-          <a:p>
-            <a:pPr algn="ctr"/>
-            <a:r>
-              <a:rPr lang="en-US" dirty="0" smtClean="0"/>
-              <a:t>= 4.6 GB/s</a:t>
-            </a:r>
-          </a:p>
-          <a:p>
-            <a:pPr algn="ctr"/>
-            <a:r>
-              <a:rPr lang="en-US" dirty="0" smtClean="0"/>
-              <a:t>33 MB/s / MPD</a:t>
-            </a:r>
-            <a:endParaRPr lang="en-US" dirty="0" smtClean="0"/>
-          </a:p>
-        </p:txBody>
-      </p:sp>
-      <p:sp>
-        <p:nvSpPr>
-          <p:cNvPr id="11" name="Right Arrow 10"/>
-          <p:cNvSpPr/>
-          <p:nvPr/>
-        </p:nvSpPr>
-        <p:spPr>
-          <a:xfrm>
-            <a:off x="3507475" y="3047347"/>
-            <a:ext cx="457200" cy="381000"/>
-          </a:xfrm>
-          <a:prstGeom prst="rightArrow">
-            <a:avLst/>
-          </a:prstGeom>
-        </p:spPr>
-        <p:style>
-          <a:lnRef idx="2">
-            <a:schemeClr val="accent1">
-              <a:shade val="50000"/>
-            </a:schemeClr>
-          </a:lnRef>
-          <a:fillRef idx="1">
-            <a:schemeClr val="accent1"/>
-          </a:fillRef>
-          <a:effectRef idx="0">
-            <a:schemeClr val="accent1"/>
-          </a:effectRef>
-          <a:fontRef idx="minor">
-            <a:schemeClr val="lt1"/>
-          </a:fontRef>
-        </p:style>
-        <p:txBody>
-          <a:bodyPr rtlCol="0" anchor="ctr"/>
-          <a:lstStyle/>
-          <a:p>
-            <a:pPr algn="ctr"/>
-            <a:endParaRPr lang="en-US"/>
-          </a:p>
-        </p:txBody>
-      </p:sp>
-      <p:sp>
-        <p:nvSpPr>
-          <p:cNvPr id="12" name="TextBox 11"/>
-          <p:cNvSpPr txBox="1"/>
-          <p:nvPr/>
-        </p:nvSpPr>
-        <p:spPr>
-          <a:xfrm>
-            <a:off x="1447800" y="2406850"/>
-            <a:ext cx="833883" cy="369332"/>
-          </a:xfrm>
-          <a:prstGeom prst="rect">
-            <a:avLst/>
-          </a:prstGeom>
-          <a:noFill/>
-          <a:ln>
-            <a:solidFill>
-              <a:schemeClr val="tx1"/>
-            </a:solidFill>
-          </a:ln>
-        </p:spPr>
-        <p:txBody>
-          <a:bodyPr wrap="none" rtlCol="0">
-            <a:spAutoFit/>
-          </a:bodyPr>
-          <a:lstStyle/>
-          <a:p>
-            <a:pPr algn="ctr"/>
-            <a:r>
-              <a:rPr lang="en-US" dirty="0" smtClean="0"/>
-              <a:t>Analog</a:t>
-            </a:r>
-            <a:endParaRPr lang="en-US" dirty="0" smtClean="0"/>
-          </a:p>
-        </p:txBody>
-      </p:sp>
-      <p:sp>
-        <p:nvSpPr>
-          <p:cNvPr id="14" name="TextBox 13"/>
-          <p:cNvSpPr txBox="1"/>
-          <p:nvPr/>
-        </p:nvSpPr>
-        <p:spPr>
-          <a:xfrm>
-            <a:off x="5943600" y="2165359"/>
-            <a:ext cx="1600200" cy="1754326"/>
-          </a:xfrm>
-          <a:prstGeom prst="rect">
-            <a:avLst/>
-          </a:prstGeom>
-          <a:noFill/>
-          <a:ln>
-            <a:solidFill>
-              <a:schemeClr val="tx1"/>
-            </a:solidFill>
-          </a:ln>
-        </p:spPr>
-        <p:txBody>
-          <a:bodyPr wrap="square" rtlCol="0">
-            <a:spAutoFit/>
-          </a:bodyPr>
-          <a:lstStyle/>
-          <a:p>
-            <a:pPr algn="ctr"/>
-            <a:r>
-              <a:rPr lang="en-US" dirty="0" smtClean="0"/>
-              <a:t>SSP</a:t>
-            </a:r>
-          </a:p>
-          <a:p>
-            <a:pPr algn="ctr"/>
-            <a:r>
-              <a:rPr lang="en-US" dirty="0" smtClean="0"/>
-              <a:t> Deconvolution</a:t>
-            </a:r>
-          </a:p>
-          <a:p>
-            <a:pPr algn="ctr"/>
-            <a:r>
-              <a:rPr lang="en-US" dirty="0" smtClean="0"/>
-              <a:t>( factor 3)</a:t>
-            </a:r>
-          </a:p>
-          <a:p>
-            <a:pPr algn="ctr"/>
-            <a:r>
-              <a:rPr lang="en-US" dirty="0" smtClean="0"/>
-              <a:t>= 1.9 GB/s</a:t>
-            </a:r>
-          </a:p>
-          <a:p>
-            <a:pPr algn="ctr"/>
-            <a:r>
-              <a:rPr lang="en-US" dirty="0" smtClean="0"/>
-              <a:t>Zero suppress</a:t>
-            </a:r>
-          </a:p>
-          <a:p>
-            <a:pPr algn="ctr"/>
-            <a:r>
-              <a:rPr lang="en-US" dirty="0" smtClean="0"/>
-              <a:t>Clustering </a:t>
-            </a:r>
-          </a:p>
-        </p:txBody>
-      </p:sp>
-      <p:sp>
-        <p:nvSpPr>
-          <p:cNvPr id="15" name="Right Arrow 14"/>
-          <p:cNvSpPr/>
-          <p:nvPr/>
-        </p:nvSpPr>
-        <p:spPr>
-          <a:xfrm>
-            <a:off x="5564875" y="3009247"/>
-            <a:ext cx="457200" cy="381000"/>
-          </a:xfrm>
-          <a:prstGeom prst="rightArrow">
-            <a:avLst/>
-          </a:prstGeom>
-        </p:spPr>
-        <p:style>
-          <a:lnRef idx="2">
-            <a:schemeClr val="accent1">
-              <a:shade val="50000"/>
-            </a:schemeClr>
-          </a:lnRef>
-          <a:fillRef idx="1">
-            <a:schemeClr val="accent1"/>
-          </a:fillRef>
-          <a:effectRef idx="0">
-            <a:schemeClr val="accent1"/>
-          </a:effectRef>
-          <a:fontRef idx="minor">
-            <a:schemeClr val="lt1"/>
-          </a:fontRef>
-        </p:style>
-        <p:txBody>
-          <a:bodyPr rtlCol="0" anchor="ctr"/>
-          <a:lstStyle/>
-          <a:p>
-            <a:pPr algn="ctr"/>
-            <a:endParaRPr lang="en-US"/>
-          </a:p>
-        </p:txBody>
-      </p:sp>
-      <p:graphicFrame>
-        <p:nvGraphicFramePr>
-          <p:cNvPr id="17" name="Table 16"/>
-          <p:cNvGraphicFramePr>
-            <a:graphicFrameLocks noGrp="1"/>
-          </p:cNvGraphicFramePr>
-          <p:nvPr>
-            <p:extLst>
-              <p:ext uri="{D42A27DB-BD31-4B8C-83A1-F6EECF244321}">
-                <p14:modId xmlns:p14="http://schemas.microsoft.com/office/powerpoint/2010/main" val="2169793788"/>
-              </p:ext>
-            </p:extLst>
-          </p:nvPr>
-        </p:nvGraphicFramePr>
-        <p:xfrm>
-          <a:off x="1327245" y="4495800"/>
-          <a:ext cx="6288659" cy="1651000"/>
-        </p:xfrm>
-        <a:graphic>
-          <a:graphicData uri="http://schemas.openxmlformats.org/drawingml/2006/table">
-            <a:tbl>
-              <a:tblPr firstRow="1" bandRow="1">
-                <a:tableStyleId>{5C22544A-7EE6-4342-B048-85BDC9FD1C3A}</a:tableStyleId>
-              </a:tblPr>
-              <a:tblGrid>
-                <a:gridCol w="2587456"/>
-                <a:gridCol w="1790905"/>
-                <a:gridCol w="1910298"/>
-              </a:tblGrid>
-              <a:tr h="370840">
-                <a:tc>
-                  <a:txBody>
-                    <a:bodyPr/>
-                    <a:lstStyle/>
-                    <a:p>
-                      <a:pPr algn="ctr"/>
-                      <a:r>
-                        <a:rPr lang="en-US" dirty="0" smtClean="0"/>
-                        <a:t>Time window</a:t>
-                      </a:r>
-                      <a:endParaRPr lang="en-US" dirty="0"/>
-                    </a:p>
-                  </a:txBody>
-                  <a:tcPr/>
-                </a:tc>
-                <a:tc>
-                  <a:txBody>
-                    <a:bodyPr/>
-                    <a:lstStyle/>
-                    <a:p>
-                      <a:pPr algn="ctr"/>
-                      <a:r>
-                        <a:rPr lang="en-US" dirty="0" smtClean="0"/>
-                        <a:t>6x25</a:t>
-                      </a:r>
-                      <a:r>
-                        <a:rPr lang="en-US" baseline="0" dirty="0" smtClean="0"/>
-                        <a:t> ns</a:t>
-                      </a:r>
-                      <a:endParaRPr lang="en-US" dirty="0"/>
-                    </a:p>
-                  </a:txBody>
-                  <a:tcPr/>
-                </a:tc>
-                <a:tc>
-                  <a:txBody>
-                    <a:bodyPr/>
-                    <a:lstStyle/>
-                    <a:p>
-                      <a:pPr algn="ctr"/>
-                      <a:r>
-                        <a:rPr lang="en-US" dirty="0" smtClean="0"/>
-                        <a:t>3x25 ns</a:t>
-                      </a:r>
-                      <a:endParaRPr lang="en-US" dirty="0"/>
-                    </a:p>
-                  </a:txBody>
-                  <a:tcPr/>
-                </a:tc>
-              </a:tr>
-              <a:tr h="370840">
-                <a:tc>
-                  <a:txBody>
-                    <a:bodyPr/>
-                    <a:lstStyle/>
-                    <a:p>
-                      <a:pPr algn="ctr"/>
-                      <a:r>
-                        <a:rPr lang="en-US" dirty="0" smtClean="0"/>
-                        <a:t>Occupancy</a:t>
-                      </a:r>
-                      <a:r>
-                        <a:rPr lang="en-US" baseline="0" dirty="0" smtClean="0"/>
-                        <a:t> forward tracker in %</a:t>
-                      </a:r>
-                      <a:endParaRPr lang="en-US" dirty="0"/>
-                    </a:p>
-                  </a:txBody>
-                  <a:tcPr anchor="ctr"/>
-                </a:tc>
-                <a:tc>
-                  <a:txBody>
-                    <a:bodyPr/>
-                    <a:lstStyle/>
-                    <a:p>
-                      <a:pPr algn="ctr"/>
-                      <a:r>
-                        <a:rPr lang="en-US" dirty="0" smtClean="0"/>
-                        <a:t>100</a:t>
-                      </a:r>
-                      <a:endParaRPr lang="en-US" dirty="0"/>
-                    </a:p>
-                  </a:txBody>
-                  <a:tcPr anchor="ctr"/>
-                </a:tc>
-                <a:tc>
-                  <a:txBody>
-                    <a:bodyPr/>
-                    <a:lstStyle/>
-                    <a:p>
-                      <a:pPr algn="ctr"/>
-                      <a:r>
-                        <a:rPr lang="en-US" dirty="0" smtClean="0"/>
-                        <a:t>30</a:t>
-                      </a:r>
-                      <a:endParaRPr lang="en-US" dirty="0"/>
-                    </a:p>
-                  </a:txBody>
-                  <a:tcPr anchor="ctr"/>
-                </a:tc>
-              </a:tr>
-              <a:tr h="370840">
-                <a:tc>
-                  <a:txBody>
-                    <a:bodyPr/>
-                    <a:lstStyle/>
-                    <a:p>
-                      <a:pPr marL="0" marR="0" indent="0" algn="ctr" defTabSz="914400" rtl="0" eaLnBrk="1" fontAlgn="auto" latinLnBrk="0" hangingPunct="1">
-                        <a:lnSpc>
-                          <a:spcPct val="100000"/>
-                        </a:lnSpc>
-                        <a:spcBef>
-                          <a:spcPts val="0"/>
-                        </a:spcBef>
-                        <a:spcAft>
-                          <a:spcPts val="0"/>
-                        </a:spcAft>
-                        <a:buClrTx/>
-                        <a:buSzTx/>
-                        <a:buFontTx/>
-                        <a:buNone/>
-                        <a:tabLst/>
-                        <a:defRPr/>
-                      </a:pPr>
-                      <a:r>
-                        <a:rPr lang="en-US" dirty="0" smtClean="0"/>
-                        <a:t>Occupancy</a:t>
-                      </a:r>
-                      <a:r>
-                        <a:rPr lang="en-US" baseline="0" dirty="0" smtClean="0"/>
-                        <a:t> back tracker</a:t>
-                      </a:r>
-                      <a:endParaRPr lang="en-US" dirty="0" smtClean="0"/>
-                    </a:p>
-                    <a:p>
-                      <a:pPr algn="ctr"/>
-                      <a:r>
-                        <a:rPr lang="en-US" dirty="0" smtClean="0"/>
-                        <a:t>In %</a:t>
-                      </a:r>
-                      <a:endParaRPr lang="en-US" dirty="0"/>
-                    </a:p>
-                  </a:txBody>
-                  <a:tcPr anchor="ctr"/>
-                </a:tc>
-                <a:tc>
-                  <a:txBody>
-                    <a:bodyPr/>
-                    <a:lstStyle/>
-                    <a:p>
-                      <a:pPr algn="ctr"/>
-                      <a:r>
-                        <a:rPr lang="en-US" dirty="0" smtClean="0"/>
-                        <a:t>37.3</a:t>
-                      </a:r>
-                      <a:endParaRPr lang="en-US" dirty="0"/>
-                    </a:p>
-                  </a:txBody>
-                  <a:tcPr anchor="ctr"/>
-                </a:tc>
-                <a:tc>
-                  <a:txBody>
-                    <a:bodyPr/>
-                    <a:lstStyle/>
-                    <a:p>
-                      <a:pPr algn="ctr"/>
-                      <a:r>
-                        <a:rPr lang="en-US" dirty="0" smtClean="0"/>
-                        <a:t>11.2</a:t>
-                      </a:r>
-                      <a:endParaRPr lang="en-US" dirty="0"/>
-                    </a:p>
-                  </a:txBody>
-                  <a:tcPr anchor="ctr"/>
-                </a:tc>
-              </a:tr>
-            </a:tbl>
-          </a:graphicData>
-        </a:graphic>
-      </p:graphicFrame>
-      <p:sp>
-        <p:nvSpPr>
-          <p:cNvPr id="3" name="TextBox 2"/>
-          <p:cNvSpPr txBox="1"/>
-          <p:nvPr/>
-        </p:nvSpPr>
-        <p:spPr>
-          <a:xfrm>
-            <a:off x="1864741" y="6324600"/>
-            <a:ext cx="5057026" cy="369332"/>
-          </a:xfrm>
-          <a:prstGeom prst="rect">
-            <a:avLst/>
-          </a:prstGeom>
-          <a:noFill/>
-          <a:ln>
-            <a:solidFill>
-              <a:schemeClr val="tx1"/>
-            </a:solidFill>
-          </a:ln>
-        </p:spPr>
-        <p:txBody>
-          <a:bodyPr wrap="none" rtlCol="0">
-            <a:spAutoFit/>
-          </a:bodyPr>
-          <a:lstStyle/>
-          <a:p>
-            <a:pPr algn="ctr"/>
-            <a:r>
-              <a:rPr lang="en-US" dirty="0" smtClean="0"/>
-              <a:t>Assume each MPD word packed on 24 bits = 3 bytes</a:t>
-            </a:r>
-            <a:endParaRPr lang="en-US" dirty="0" smtClean="0"/>
-          </a:p>
-        </p:txBody>
-      </p:sp>
-    </p:spTree>
-    <p:extLst>
-      <p:ext uri="{BB962C8B-B14F-4D97-AF65-F5344CB8AC3E}">
-        <p14:creationId xmlns:p14="http://schemas.microsoft.com/office/powerpoint/2010/main" val="2922456055"/>
-      </p:ext>
-    </p:extLst>
-  </p:cSld>
-  <p:clrMapOvr>
-    <a:masterClrMapping/>
-  </p:clrMapOvr>
-</p:sld>
-</file>
-
-<file path=ppt/slides/slide11.xml><?xml version="1.0" encoding="utf-8"?>
-<p:sld xmlns:a="http://schemas.openxmlformats.org/drawingml/2006/main" xmlns:r="http://schemas.openxmlformats.org/officeDocument/2006/relationships" xmlns:p="http://schemas.openxmlformats.org/presentationml/2006/main">
-  <p:cSld>
-    <p:spTree>
-      <p:nvGrpSpPr>
-        <p:cNvPr id="1" name=""/>
-        <p:cNvGrpSpPr/>
-        <p:nvPr/>
-      </p:nvGrpSpPr>
-      <p:grpSpPr>
-        <a:xfrm>
-          <a:off x="0" y="0"/>
-          <a:ext cx="0" cy="0"/>
-          <a:chOff x="0" y="0"/>
-          <a:chExt cx="0" cy="0"/>
-        </a:xfrm>
-      </p:grpSpPr>
-      <p:sp>
-        <p:nvSpPr>
           <p:cNvPr id="5" name="TextBox 4"/>
           <p:cNvSpPr txBox="1"/>
           <p:nvPr/>
@@ -4519,8 +3780,9 @@
             <a:pPr algn="ctr"/>
             <a:r>
               <a:rPr lang="en-US" dirty="0" smtClean="0"/>
-              <a:t>153,640</a:t>
-            </a:r>
+              <a:t>112,640</a:t>
+            </a:r>
+            <a:endParaRPr lang="en-US" dirty="0" smtClean="0"/>
           </a:p>
           <a:p>
             <a:pPr algn="ctr"/>
@@ -4639,25 +3901,41 @@
             <a:pPr algn="ctr"/>
             <a:r>
               <a:rPr lang="en-US" dirty="0" smtClean="0"/>
-              <a:t>83 Boards</a:t>
-            </a:r>
-          </a:p>
-          <a:p>
-            <a:pPr algn="ctr"/>
-            <a:r>
-              <a:rPr lang="en-US" dirty="0"/>
-              <a:t>9</a:t>
-            </a:r>
-            <a:r>
-              <a:rPr lang="en-US" dirty="0" smtClean="0"/>
-              <a:t>218 MB/s in</a:t>
-            </a:r>
-          </a:p>
-          <a:p>
-            <a:pPr algn="ctr"/>
-            <a:r>
-              <a:rPr lang="en-US" dirty="0" smtClean="0"/>
-              <a:t>315 MB/s out</a:t>
+              <a:t>55</a:t>
+            </a:r>
+            <a:r>
+              <a:rPr lang="en-US" dirty="0" smtClean="0"/>
+              <a:t> </a:t>
+            </a:r>
+            <a:r>
+              <a:rPr lang="en-US" dirty="0" smtClean="0"/>
+              <a:t>Boards</a:t>
+            </a:r>
+          </a:p>
+          <a:p>
+            <a:pPr algn="ctr"/>
+            <a:r>
+              <a:rPr lang="en-US" dirty="0" smtClean="0"/>
+              <a:t>1,030</a:t>
+            </a:r>
+            <a:r>
+              <a:rPr lang="en-US" dirty="0" smtClean="0"/>
+              <a:t> </a:t>
+            </a:r>
+            <a:r>
+              <a:rPr lang="en-US" dirty="0" smtClean="0"/>
+              <a:t>MB/s in</a:t>
+            </a:r>
+          </a:p>
+          <a:p>
+            <a:pPr algn="ctr"/>
+            <a:r>
+              <a:rPr lang="en-US" dirty="0" smtClean="0"/>
+              <a:t>1,800 </a:t>
+            </a:r>
+            <a:r>
+              <a:rPr lang="en-US" dirty="0" smtClean="0"/>
+              <a:t>MB/s out</a:t>
             </a:r>
           </a:p>
           <a:p>
@@ -4717,7 +3995,15 @@
             <a:pPr algn="ctr"/>
             <a:r>
               <a:rPr lang="en-US" dirty="0" smtClean="0"/>
-              <a:t>315 MB/s in</a:t>
+              <a:t>1800</a:t>
+            </a:r>
+            <a:r>
+              <a:rPr lang="en-US" dirty="0" smtClean="0"/>
+              <a:t> </a:t>
+            </a:r>
+            <a:r>
+              <a:rPr lang="en-US" dirty="0" smtClean="0"/>
+              <a:t>MB/s in</a:t>
             </a:r>
           </a:p>
           <a:p>
@@ -4731,7 +4017,15 @@
             <a:pPr algn="ctr"/>
             <a:r>
               <a:rPr lang="en-US" b="1" dirty="0" smtClean="0"/>
-              <a:t>105 MB/s out</a:t>
+              <a:t>300</a:t>
+            </a:r>
+            <a:r>
+              <a:rPr lang="en-US" b="1" dirty="0" smtClean="0"/>
+              <a:t> </a:t>
+            </a:r>
+            <a:r>
+              <a:rPr lang="en-US" b="1" dirty="0" smtClean="0"/>
+              <a:t>MB/s out</a:t>
             </a:r>
           </a:p>
           <a:p>
@@ -4944,7 +4238,15 @@
             <a:pPr algn="ctr"/>
             <a:r>
               <a:rPr lang="en-US" dirty="0" smtClean="0"/>
-              <a:t>180.6 MB/s</a:t>
+              <a:t>369.9</a:t>
+            </a:r>
+            <a:r>
+              <a:rPr lang="en-US" dirty="0" smtClean="0"/>
+              <a:t> </a:t>
+            </a:r>
+            <a:r>
+              <a:rPr lang="en-US" dirty="0" smtClean="0"/>
+              <a:t>MB/s</a:t>
             </a:r>
             <a:endParaRPr lang="en-US" dirty="0"/>
           </a:p>
@@ -6112,7 +5414,7 @@
 </p:sld>
 </file>
 
-<file path=ppt/slides/slide12.xml><?xml version="1.0" encoding="utf-8"?>
+<file path=ppt/slides/slide11.xml><?xml version="1.0" encoding="utf-8"?>
 <p:sld xmlns:a="http://schemas.openxmlformats.org/drawingml/2006/main" xmlns:r="http://schemas.openxmlformats.org/officeDocument/2006/relationships" xmlns:p="http://schemas.openxmlformats.org/presentationml/2006/main">
   <p:cSld>
     <p:spTree>
@@ -6852,7 +6154,7 @@
 </p:sld>
 </file>
 
-<file path=ppt/slides/slide13.xml><?xml version="1.0" encoding="utf-8"?>
+<file path=ppt/slides/slide12.xml><?xml version="1.0" encoding="utf-8"?>
 <p:sld xmlns:a="http://schemas.openxmlformats.org/drawingml/2006/main" xmlns:r="http://schemas.openxmlformats.org/officeDocument/2006/relationships" xmlns:p="http://schemas.openxmlformats.org/presentationml/2006/main">
   <p:cSld>
     <p:spTree>
@@ -8724,6 +8026,121 @@
 </p:sld>
 </file>
 
+<file path=ppt/slides/slide13.xml><?xml version="1.0" encoding="utf-8"?>
+<p:sld xmlns:a="http://schemas.openxmlformats.org/drawingml/2006/main" xmlns:r="http://schemas.openxmlformats.org/officeDocument/2006/relationships" xmlns:p="http://schemas.openxmlformats.org/presentationml/2006/main">
+  <p:cSld>
+    <p:spTree>
+      <p:nvGrpSpPr>
+        <p:cNvPr id="1" name=""/>
+        <p:cNvGrpSpPr/>
+        <p:nvPr/>
+      </p:nvGrpSpPr>
+      <p:grpSpPr>
+        <a:xfrm>
+          <a:off x="0" y="0"/>
+          <a:ext cx="0" cy="0"/>
+          <a:chOff x="0" y="0"/>
+          <a:chExt cx="0" cy="0"/>
+        </a:xfrm>
+      </p:grpSpPr>
+      <p:sp>
+        <p:nvSpPr>
+          <p:cNvPr id="2" name="Title 1"/>
+          <p:cNvSpPr>
+            <a:spLocks noGrp="1"/>
+          </p:cNvSpPr>
+          <p:nvPr>
+            <p:ph type="title"/>
+          </p:nvPr>
+        </p:nvSpPr>
+        <p:spPr/>
+        <p:txBody>
+          <a:bodyPr/>
+          <a:lstStyle/>
+          <a:p>
+            <a:r>
+              <a:rPr lang="en-US" dirty="0" smtClean="0"/>
+              <a:t>Conclusion</a:t>
+            </a:r>
+            <a:endParaRPr lang="en-US" dirty="0"/>
+          </a:p>
+        </p:txBody>
+      </p:sp>
+      <p:sp>
+        <p:nvSpPr>
+          <p:cNvPr id="3" name="Content Placeholder 2"/>
+          <p:cNvSpPr>
+            <a:spLocks noGrp="1"/>
+          </p:cNvSpPr>
+          <p:nvPr>
+            <p:ph idx="1"/>
+          </p:nvPr>
+        </p:nvSpPr>
+        <p:spPr/>
+        <p:txBody>
+          <a:bodyPr>
+            <a:normAutofit lnSpcReduction="10000"/>
+          </a:bodyPr>
+          <a:lstStyle/>
+          <a:p>
+            <a:r>
+              <a:rPr lang="en-US" dirty="0" smtClean="0"/>
+              <a:t>Estimated rate for max 5 KHz ( expect to run at 2 to 3 KHz )</a:t>
+            </a:r>
+          </a:p>
+          <a:p>
+            <a:r>
+              <a:rPr lang="en-US" dirty="0" smtClean="0"/>
+              <a:t>325.3 MB/s for GEp5</a:t>
+            </a:r>
+          </a:p>
+          <a:p>
+            <a:r>
+              <a:rPr lang="en-US" dirty="0" smtClean="0"/>
+              <a:t>370 MB/s for </a:t>
+            </a:r>
+            <a:r>
+              <a:rPr lang="en-US" dirty="0" err="1" smtClean="0"/>
+              <a:t>GEn</a:t>
+            </a:r>
+            <a:r>
+              <a:rPr lang="en-US" dirty="0" smtClean="0"/>
+              <a:t> ( no geometrical correlation)</a:t>
+            </a:r>
+          </a:p>
+          <a:p>
+            <a:r>
+              <a:rPr lang="en-US" dirty="0" smtClean="0"/>
+              <a:t>Will work on clustering and plane coincidence in SSP, reduction factor to be determined using simulation</a:t>
+            </a:r>
+          </a:p>
+          <a:p>
+            <a:r>
+              <a:rPr lang="en-US" dirty="0" smtClean="0"/>
+              <a:t>Need implement hardware and test</a:t>
+            </a:r>
+          </a:p>
+          <a:p>
+            <a:endParaRPr lang="en-US" dirty="0" smtClean="0"/>
+          </a:p>
+          <a:p>
+            <a:endParaRPr lang="en-US" dirty="0"/>
+          </a:p>
+        </p:txBody>
+      </p:sp>
+    </p:spTree>
+    <p:extLst>
+      <p:ext uri="{BB962C8B-B14F-4D97-AF65-F5344CB8AC3E}">
+        <p14:creationId xmlns:p14="http://schemas.microsoft.com/office/powerpoint/2010/main" val="2409290355"/>
+      </p:ext>
+    </p:extLst>
+  </p:cSld>
+  <p:clrMapOvr>
+    <a:masterClrMapping/>
+  </p:clrMapOvr>
+</p:sld>
+</file>
+
 <file path=ppt/slides/slide2.xml><?xml version="1.0" encoding="utf-8"?>
 <p:sld xmlns:a="http://schemas.openxmlformats.org/drawingml/2006/main" xmlns:r="http://schemas.openxmlformats.org/officeDocument/2006/relationships" xmlns:p="http://schemas.openxmlformats.org/presentationml/2006/main">
   <p:cSld>
@@ -8753,37 +8170,551 @@
         </p:nvSpPr>
         <p:spPr/>
         <p:txBody>
-          <a:bodyPr>
-            <a:normAutofit fontScale="90000"/>
+          <a:bodyPr/>
+          <a:lstStyle/>
+          <a:p>
+            <a:r>
+              <a:rPr lang="en-US" dirty="0" smtClean="0"/>
+              <a:t>GEM data flow </a:t>
+            </a:r>
+            <a:r>
+              <a:rPr lang="en-US" dirty="0" err="1" smtClean="0"/>
+              <a:t>GEp</a:t>
+            </a:r>
+            <a:endParaRPr lang="en-US" dirty="0"/>
+          </a:p>
+        </p:txBody>
+      </p:sp>
+      <p:sp>
+        <p:nvSpPr>
+          <p:cNvPr id="4" name="TextBox 3"/>
+          <p:cNvSpPr txBox="1"/>
+          <p:nvPr/>
+        </p:nvSpPr>
+        <p:spPr>
+          <a:xfrm>
+            <a:off x="221776" y="2439623"/>
+            <a:ext cx="1143000" cy="923330"/>
+          </a:xfrm>
+          <a:prstGeom prst="rect">
+            <a:avLst/>
+          </a:prstGeom>
+          <a:noFill/>
+          <a:ln>
+            <a:solidFill>
+              <a:schemeClr val="tx1"/>
+            </a:solidFill>
+          </a:ln>
+        </p:spPr>
+        <p:txBody>
+          <a:bodyPr wrap="square" rtlCol="0">
+            <a:spAutoFit/>
           </a:bodyPr>
           <a:lstStyle/>
           <a:p>
-            <a:r>
-              <a:rPr lang="en-US" dirty="0" smtClean="0"/>
-              <a:t>GEp5 event size before deconvolution</a:t>
+            <a:pPr algn="ctr"/>
+            <a:r>
+              <a:rPr lang="en-US" dirty="0" smtClean="0"/>
+              <a:t>GEM</a:t>
+            </a:r>
+          </a:p>
+          <a:p>
+            <a:pPr algn="ctr"/>
+            <a:r>
+              <a:rPr lang="en-US" dirty="0" smtClean="0"/>
+              <a:t>153 640</a:t>
+            </a:r>
+          </a:p>
+          <a:p>
+            <a:pPr algn="ctr"/>
+            <a:r>
+              <a:rPr lang="en-US" dirty="0" smtClean="0"/>
+              <a:t>strips</a:t>
+            </a:r>
+            <a:r>
+              <a:rPr lang="en-US" dirty="0" smtClean="0"/>
+              <a:t> </a:t>
+            </a:r>
+            <a:endParaRPr lang="en-US" dirty="0" smtClean="0"/>
+          </a:p>
+        </p:txBody>
+      </p:sp>
+      <p:sp>
+        <p:nvSpPr>
+          <p:cNvPr id="5" name="Right Arrow 4"/>
+          <p:cNvSpPr/>
+          <p:nvPr/>
+        </p:nvSpPr>
+        <p:spPr>
+          <a:xfrm>
+            <a:off x="1447800" y="2710788"/>
+            <a:ext cx="914400" cy="381000"/>
+          </a:xfrm>
+          <a:prstGeom prst="rightArrow">
+            <a:avLst/>
+          </a:prstGeom>
+        </p:spPr>
+        <p:style>
+          <a:lnRef idx="2">
+            <a:schemeClr val="accent1">
+              <a:shade val="50000"/>
+            </a:schemeClr>
+          </a:lnRef>
+          <a:fillRef idx="1">
+            <a:schemeClr val="accent1"/>
+          </a:fillRef>
+          <a:effectRef idx="0">
+            <a:schemeClr val="accent1"/>
+          </a:effectRef>
+          <a:fontRef idx="minor">
+            <a:schemeClr val="lt1"/>
+          </a:fontRef>
+        </p:style>
+        <p:txBody>
+          <a:bodyPr rtlCol="0" anchor="ctr"/>
+          <a:lstStyle/>
+          <a:p>
+            <a:pPr algn="ctr"/>
+            <a:endParaRPr lang="en-US"/>
+          </a:p>
+        </p:txBody>
+      </p:sp>
+      <p:sp>
+        <p:nvSpPr>
+          <p:cNvPr id="7" name="TextBox 6"/>
+          <p:cNvSpPr txBox="1"/>
+          <p:nvPr/>
+        </p:nvSpPr>
+        <p:spPr>
+          <a:xfrm>
+            <a:off x="2362200" y="1828802"/>
+            <a:ext cx="1676400" cy="2308324"/>
+          </a:xfrm>
+          <a:prstGeom prst="rect">
+            <a:avLst/>
+          </a:prstGeom>
+          <a:noFill/>
+          <a:ln>
+            <a:solidFill>
+              <a:schemeClr val="tx1"/>
+            </a:solidFill>
+          </a:ln>
+        </p:spPr>
+        <p:txBody>
+          <a:bodyPr wrap="square" rtlCol="0">
+            <a:spAutoFit/>
+          </a:bodyPr>
+          <a:lstStyle/>
+          <a:p>
+            <a:pPr algn="ctr"/>
+            <a:r>
+              <a:rPr lang="en-US" dirty="0" smtClean="0"/>
+              <a:t>MPD</a:t>
+            </a:r>
+          </a:p>
+          <a:p>
+            <a:pPr algn="ctr"/>
+            <a:r>
+              <a:rPr lang="en-US" dirty="0" smtClean="0"/>
+              <a:t>153 640</a:t>
+            </a:r>
+          </a:p>
+          <a:p>
+            <a:pPr algn="ctr"/>
+            <a:r>
+              <a:rPr lang="en-US" dirty="0" smtClean="0"/>
+              <a:t>X 6 samples x 3 bytes</a:t>
+            </a:r>
+          </a:p>
+          <a:p>
+            <a:pPr algn="ctr"/>
+            <a:r>
+              <a:rPr lang="en-US" dirty="0" smtClean="0"/>
+              <a:t>FT=5.99 GB/s</a:t>
+            </a:r>
+          </a:p>
+          <a:p>
+            <a:pPr algn="ctr"/>
+            <a:r>
+              <a:rPr lang="en-US" dirty="0" smtClean="0"/>
+              <a:t>BT=10.2 GB/s</a:t>
+            </a:r>
+          </a:p>
+          <a:p>
+            <a:pPr algn="ctr"/>
+            <a:r>
+              <a:rPr lang="en-US" dirty="0" smtClean="0"/>
+              <a:t>Total= 16.2 GB/s</a:t>
+            </a:r>
+          </a:p>
+        </p:txBody>
+      </p:sp>
+      <p:sp>
+        <p:nvSpPr>
+          <p:cNvPr id="8" name="TextBox 7"/>
+          <p:cNvSpPr txBox="1"/>
+          <p:nvPr/>
+        </p:nvSpPr>
+        <p:spPr>
+          <a:xfrm>
+            <a:off x="3618487" y="1154668"/>
+            <a:ext cx="1813766" cy="369332"/>
+          </a:xfrm>
+          <a:prstGeom prst="rect">
+            <a:avLst/>
+          </a:prstGeom>
+          <a:noFill/>
+          <a:ln>
+            <a:noFill/>
+          </a:ln>
+        </p:spPr>
+        <p:txBody>
+          <a:bodyPr wrap="none" rtlCol="0">
+            <a:spAutoFit/>
+          </a:bodyPr>
+          <a:lstStyle/>
+          <a:p>
+            <a:pPr algn="ctr"/>
+            <a:r>
+              <a:rPr lang="en-US" dirty="0" smtClean="0"/>
+              <a:t>5 KHz trigger rate</a:t>
+            </a:r>
+            <a:endParaRPr lang="en-US" dirty="0" smtClean="0"/>
+          </a:p>
+        </p:txBody>
+      </p:sp>
+      <p:sp>
+        <p:nvSpPr>
+          <p:cNvPr id="10" name="TextBox 9"/>
+          <p:cNvSpPr txBox="1"/>
+          <p:nvPr/>
+        </p:nvSpPr>
+        <p:spPr>
+          <a:xfrm>
+            <a:off x="4521511" y="1828800"/>
+            <a:ext cx="1805364" cy="2862322"/>
+          </a:xfrm>
+          <a:prstGeom prst="rect">
+            <a:avLst/>
+          </a:prstGeom>
+          <a:noFill/>
+          <a:ln>
+            <a:solidFill>
+              <a:schemeClr val="tx1"/>
+            </a:solidFill>
+          </a:ln>
+        </p:spPr>
+        <p:txBody>
+          <a:bodyPr wrap="square" rtlCol="0">
+            <a:spAutoFit/>
+          </a:bodyPr>
+          <a:lstStyle/>
+          <a:p>
+            <a:pPr algn="ctr"/>
+            <a:r>
+              <a:rPr lang="en-US" dirty="0" smtClean="0"/>
+              <a:t>MPD</a:t>
+            </a:r>
+          </a:p>
+          <a:p>
+            <a:pPr algn="ctr"/>
+            <a:r>
+              <a:rPr lang="en-US" dirty="0" smtClean="0"/>
+              <a:t>Zero suppress</a:t>
+            </a:r>
+          </a:p>
+          <a:p>
+            <a:pPr algn="ctr"/>
+            <a:r>
+              <a:rPr lang="en-US" dirty="0" smtClean="0"/>
+              <a:t>FT=1.63GB/s</a:t>
             </a:r>
             <a:endParaRPr lang="en-US" dirty="0"/>
+          </a:p>
+          <a:p>
+            <a:pPr algn="ctr"/>
+            <a:r>
+              <a:rPr lang="en-US" dirty="0" smtClean="0"/>
+              <a:t>BT=2.76 GB/s</a:t>
+            </a:r>
+            <a:endParaRPr lang="en-US" dirty="0" smtClean="0"/>
+          </a:p>
+          <a:p>
+            <a:pPr algn="ctr"/>
+            <a:r>
+              <a:rPr lang="en-US" dirty="0" smtClean="0"/>
+              <a:t>Geometrical cut (factor 3)</a:t>
+            </a:r>
+          </a:p>
+          <a:p>
+            <a:pPr algn="ctr"/>
+            <a:r>
+              <a:rPr lang="en-US" dirty="0" smtClean="0"/>
+              <a:t>FT=0.53 </a:t>
+            </a:r>
+            <a:r>
+              <a:rPr lang="en-US" dirty="0"/>
+              <a:t>GB/s</a:t>
+            </a:r>
+          </a:p>
+          <a:p>
+            <a:pPr algn="ctr"/>
+            <a:r>
+              <a:rPr lang="en-US" dirty="0" smtClean="0"/>
+              <a:t>BT=0.9 GB/s</a:t>
+            </a:r>
+            <a:endParaRPr lang="en-US" dirty="0"/>
+          </a:p>
+          <a:p>
+            <a:pPr algn="ctr"/>
+            <a:endParaRPr lang="en-US" dirty="0" smtClean="0"/>
+          </a:p>
+          <a:p>
+            <a:pPr algn="ctr"/>
+            <a:endParaRPr lang="en-US" dirty="0" smtClean="0"/>
+          </a:p>
+        </p:txBody>
+      </p:sp>
+      <p:sp>
+        <p:nvSpPr>
+          <p:cNvPr id="11" name="Right Arrow 10"/>
+          <p:cNvSpPr/>
+          <p:nvPr/>
+        </p:nvSpPr>
+        <p:spPr>
+          <a:xfrm>
+            <a:off x="4068170" y="2710788"/>
+            <a:ext cx="457200" cy="381000"/>
+          </a:xfrm>
+          <a:prstGeom prst="rightArrow">
+            <a:avLst/>
+          </a:prstGeom>
+        </p:spPr>
+        <p:style>
+          <a:lnRef idx="2">
+            <a:schemeClr val="accent1">
+              <a:shade val="50000"/>
+            </a:schemeClr>
+          </a:lnRef>
+          <a:fillRef idx="1">
+            <a:schemeClr val="accent1"/>
+          </a:fillRef>
+          <a:effectRef idx="0">
+            <a:schemeClr val="accent1"/>
+          </a:effectRef>
+          <a:fontRef idx="minor">
+            <a:schemeClr val="lt1"/>
+          </a:fontRef>
+        </p:style>
+        <p:txBody>
+          <a:bodyPr rtlCol="0" anchor="ctr"/>
+          <a:lstStyle/>
+          <a:p>
+            <a:pPr algn="ctr"/>
+            <a:endParaRPr lang="en-US"/>
+          </a:p>
+        </p:txBody>
+      </p:sp>
+      <p:sp>
+        <p:nvSpPr>
+          <p:cNvPr id="12" name="TextBox 11"/>
+          <p:cNvSpPr txBox="1"/>
+          <p:nvPr/>
+        </p:nvSpPr>
+        <p:spPr>
+          <a:xfrm>
+            <a:off x="1447800" y="2070291"/>
+            <a:ext cx="833883" cy="369332"/>
+          </a:xfrm>
+          <a:prstGeom prst="rect">
+            <a:avLst/>
+          </a:prstGeom>
+          <a:noFill/>
+          <a:ln>
+            <a:solidFill>
+              <a:schemeClr val="tx1"/>
+            </a:solidFill>
+          </a:ln>
+        </p:spPr>
+        <p:txBody>
+          <a:bodyPr wrap="none" rtlCol="0">
+            <a:spAutoFit/>
+          </a:bodyPr>
+          <a:lstStyle/>
+          <a:p>
+            <a:pPr algn="ctr"/>
+            <a:r>
+              <a:rPr lang="en-US" dirty="0" smtClean="0"/>
+              <a:t>Analog</a:t>
+            </a:r>
+            <a:endParaRPr lang="en-US" dirty="0" smtClean="0"/>
+          </a:p>
+        </p:txBody>
+      </p:sp>
+      <p:sp>
+        <p:nvSpPr>
+          <p:cNvPr id="14" name="TextBox 13"/>
+          <p:cNvSpPr txBox="1"/>
+          <p:nvPr/>
+        </p:nvSpPr>
+        <p:spPr>
+          <a:xfrm>
+            <a:off x="6784074" y="1432027"/>
+            <a:ext cx="1902725" cy="3139321"/>
+          </a:xfrm>
+          <a:prstGeom prst="rect">
+            <a:avLst/>
+          </a:prstGeom>
+          <a:noFill/>
+          <a:ln>
+            <a:solidFill>
+              <a:schemeClr val="tx1"/>
+            </a:solidFill>
+          </a:ln>
+        </p:spPr>
+        <p:txBody>
+          <a:bodyPr wrap="square" rtlCol="0">
+            <a:spAutoFit/>
+          </a:bodyPr>
+          <a:lstStyle/>
+          <a:p>
+            <a:pPr algn="ctr"/>
+            <a:r>
+              <a:rPr lang="en-US" dirty="0" smtClean="0"/>
+              <a:t>SSP</a:t>
+            </a:r>
+          </a:p>
+          <a:p>
+            <a:pPr algn="ctr"/>
+            <a:r>
+              <a:rPr lang="en-US" dirty="0" smtClean="0"/>
+              <a:t> Deconvolution</a:t>
+            </a:r>
+          </a:p>
+          <a:p>
+            <a:pPr algn="ctr"/>
+            <a:r>
+              <a:rPr lang="en-US" dirty="0" smtClean="0"/>
+              <a:t>( factor 2)</a:t>
+            </a:r>
+          </a:p>
+          <a:p>
+            <a:pPr algn="ctr"/>
+            <a:r>
+              <a:rPr lang="en-US" dirty="0" smtClean="0"/>
+              <a:t>FT=0.26 </a:t>
+            </a:r>
+            <a:r>
+              <a:rPr lang="en-US" dirty="0"/>
+              <a:t>GB/s</a:t>
+            </a:r>
+          </a:p>
+          <a:p>
+            <a:pPr algn="ctr"/>
+            <a:r>
+              <a:rPr lang="en-US" dirty="0" smtClean="0"/>
+              <a:t>BT=0.45GB/s</a:t>
+            </a:r>
+          </a:p>
+          <a:p>
+            <a:pPr algn="ctr"/>
+            <a:r>
+              <a:rPr lang="en-US" dirty="0" smtClean="0"/>
+              <a:t>Keep Amplitude and time (3)</a:t>
+            </a:r>
+          </a:p>
+          <a:p>
+            <a:pPr algn="ctr"/>
+            <a:r>
+              <a:rPr lang="en-US" dirty="0" smtClean="0"/>
+              <a:t>FT=0.09 </a:t>
+            </a:r>
+            <a:r>
+              <a:rPr lang="en-US" dirty="0"/>
+              <a:t>GB/s</a:t>
+            </a:r>
+          </a:p>
+          <a:p>
+            <a:pPr algn="ctr"/>
+            <a:r>
+              <a:rPr lang="en-US" dirty="0" smtClean="0"/>
+              <a:t>BT=0.15 GB/s</a:t>
+            </a:r>
+          </a:p>
+          <a:p>
+            <a:pPr algn="ctr"/>
+            <a:r>
+              <a:rPr lang="en-US" dirty="0" smtClean="0"/>
+              <a:t>Total</a:t>
+            </a:r>
+          </a:p>
+          <a:p>
+            <a:pPr algn="ctr"/>
+            <a:r>
+              <a:rPr lang="en-US" dirty="0" smtClean="0"/>
+              <a:t>240 MB/s</a:t>
+            </a:r>
+            <a:endParaRPr lang="en-US" dirty="0" smtClean="0"/>
+          </a:p>
+        </p:txBody>
+      </p:sp>
+      <p:sp>
+        <p:nvSpPr>
+          <p:cNvPr id="15" name="Right Arrow 14"/>
+          <p:cNvSpPr/>
+          <p:nvPr/>
+        </p:nvSpPr>
+        <p:spPr>
+          <a:xfrm>
+            <a:off x="6326875" y="2672688"/>
+            <a:ext cx="457200" cy="381000"/>
+          </a:xfrm>
+          <a:prstGeom prst="rightArrow">
+            <a:avLst/>
+          </a:prstGeom>
+        </p:spPr>
+        <p:style>
+          <a:lnRef idx="2">
+            <a:schemeClr val="accent1">
+              <a:shade val="50000"/>
+            </a:schemeClr>
+          </a:lnRef>
+          <a:fillRef idx="1">
+            <a:schemeClr val="accent1"/>
+          </a:fillRef>
+          <a:effectRef idx="0">
+            <a:schemeClr val="accent1"/>
+          </a:effectRef>
+          <a:fontRef idx="minor">
+            <a:schemeClr val="lt1"/>
+          </a:fontRef>
+        </p:style>
+        <p:txBody>
+          <a:bodyPr rtlCol="0" anchor="ctr"/>
+          <a:lstStyle/>
+          <a:p>
+            <a:pPr algn="ctr"/>
+            <a:endParaRPr lang="en-US"/>
           </a:p>
         </p:txBody>
       </p:sp>
       <p:graphicFrame>
         <p:nvGraphicFramePr>
-          <p:cNvPr id="4" name="Content Placeholder 3"/>
+          <p:cNvPr id="17" name="Table 16"/>
           <p:cNvGraphicFramePr>
             <a:graphicFrameLocks noGrp="1"/>
           </p:cNvGraphicFramePr>
           <p:nvPr>
-            <p:ph idx="1"/>
             <p:extLst>
               <p:ext uri="{D42A27DB-BD31-4B8C-83A1-F6EECF244321}">
-                <p14:modId xmlns:p14="http://schemas.microsoft.com/office/powerpoint/2010/main" val="75420547"/>
+                <p14:modId xmlns:p14="http://schemas.microsoft.com/office/powerpoint/2010/main" val="3838405657"/>
               </p:ext>
             </p:extLst>
           </p:nvPr>
         </p:nvGraphicFramePr>
         <p:xfrm>
-          <a:off x="228601" y="1447800"/>
-          <a:ext cx="8762999" cy="4091210"/>
+          <a:off x="304800" y="4800600"/>
+          <a:ext cx="6288659" cy="1737360"/>
         </p:xfrm>
         <a:graphic>
           <a:graphicData uri="http://schemas.openxmlformats.org/drawingml/2006/table">
@@ -8792,700 +8723,180 @@
                 <a:tableStyleId>{5C22544A-7EE6-4342-B048-85BDC9FD1C3A}</a:tableStyleId>
               </a:tblPr>
               <a:tblGrid>
-                <a:gridCol w="1251857"/>
-                <a:gridCol w="1251857"/>
-                <a:gridCol w="1251857"/>
-                <a:gridCol w="1251857"/>
-                <a:gridCol w="1251857"/>
-                <a:gridCol w="1251857"/>
-                <a:gridCol w="1251857"/>
+                <a:gridCol w="2587456"/>
+                <a:gridCol w="1790905"/>
+                <a:gridCol w="1910298"/>
               </a:tblGrid>
-              <a:tr h="916607">
-                <a:tc>
-                  <a:txBody>
-                    <a:bodyPr/>
-                    <a:lstStyle/>
-                    <a:p>
-                      <a:pPr algn="ctr"/>
-                      <a:r>
-                        <a:rPr lang="en-US" dirty="0" smtClean="0"/>
-                        <a:t>Detector</a:t>
-                      </a:r>
-                      <a:endParaRPr lang="en-US" dirty="0"/>
-                    </a:p>
-                  </a:txBody>
-                  <a:tcPr anchor="ctr"/>
-                </a:tc>
-                <a:tc>
-                  <a:txBody>
-                    <a:bodyPr/>
-                    <a:lstStyle/>
-                    <a:p>
-                      <a:pPr algn="ctr"/>
-                      <a:r>
-                        <a:rPr lang="en-US" dirty="0" smtClean="0"/>
-                        <a:t>Channels</a:t>
-                      </a:r>
-                      <a:endParaRPr lang="en-US" dirty="0"/>
-                    </a:p>
-                  </a:txBody>
-                  <a:tcPr anchor="ctr"/>
-                </a:tc>
-                <a:tc>
-                  <a:txBody>
-                    <a:bodyPr/>
-                    <a:lstStyle/>
-                    <a:p>
-                      <a:pPr algn="ctr"/>
-                      <a:r>
-                        <a:rPr lang="en-US" dirty="0" smtClean="0"/>
-                        <a:t>Single</a:t>
+              <a:tr h="457200">
+                <a:tc>
+                  <a:txBody>
+                    <a:bodyPr/>
+                    <a:lstStyle/>
+                    <a:p>
+                      <a:pPr algn="ctr"/>
+                      <a:r>
+                        <a:rPr lang="en-US" dirty="0" smtClean="0"/>
+                        <a:t>Time window</a:t>
+                      </a:r>
+                      <a:endParaRPr lang="en-US" dirty="0"/>
+                    </a:p>
+                  </a:txBody>
+                  <a:tcPr/>
+                </a:tc>
+                <a:tc>
+                  <a:txBody>
+                    <a:bodyPr/>
+                    <a:lstStyle/>
+                    <a:p>
+                      <a:pPr algn="ctr"/>
+                      <a:r>
+                        <a:rPr lang="en-US" dirty="0" smtClean="0"/>
+                        <a:t>6x25</a:t>
                       </a:r>
                       <a:r>
                         <a:rPr lang="en-US" baseline="0" dirty="0" smtClean="0"/>
-                        <a:t> rate</a:t>
-                      </a:r>
-                    </a:p>
-                    <a:p>
-                      <a:pPr algn="ctr"/>
+                        <a:t> ns</a:t>
+                      </a:r>
+                      <a:endParaRPr lang="en-US" dirty="0"/>
+                    </a:p>
+                  </a:txBody>
+                  <a:tcPr/>
+                </a:tc>
+                <a:tc>
+                  <a:txBody>
+                    <a:bodyPr/>
+                    <a:lstStyle/>
+                    <a:p>
+                      <a:pPr algn="ctr"/>
+                      <a:r>
+                        <a:rPr lang="en-US" dirty="0" smtClean="0"/>
+                        <a:t>3x25 ns</a:t>
+                      </a:r>
+                      <a:endParaRPr lang="en-US" dirty="0"/>
+                    </a:p>
+                  </a:txBody>
+                  <a:tcPr/>
+                </a:tc>
+              </a:tr>
+              <a:tr h="370840">
+                <a:tc>
+                  <a:txBody>
+                    <a:bodyPr/>
+                    <a:lstStyle/>
+                    <a:p>
+                      <a:pPr algn="ctr"/>
+                      <a:r>
+                        <a:rPr lang="en-US" dirty="0" smtClean="0"/>
+                        <a:t>Occupancy</a:t>
+                      </a:r>
                       <a:r>
                         <a:rPr lang="en-US" baseline="0" dirty="0" smtClean="0"/>
-                        <a:t>Hz</a:t>
-                      </a:r>
-                      <a:endParaRPr lang="en-US" dirty="0"/>
-                    </a:p>
-                  </a:txBody>
-                  <a:tcPr anchor="ctr"/>
-                </a:tc>
-                <a:tc>
-                  <a:txBody>
-                    <a:bodyPr/>
-                    <a:lstStyle/>
-                    <a:p>
-                      <a:pPr algn="ctr"/>
+                        <a:t> forward tracker in %</a:t>
+                      </a:r>
+                      <a:endParaRPr lang="en-US" dirty="0"/>
+                    </a:p>
+                  </a:txBody>
+                  <a:tcPr anchor="ctr"/>
+                </a:tc>
+                <a:tc>
+                  <a:txBody>
+                    <a:bodyPr/>
+                    <a:lstStyle/>
+                    <a:p>
+                      <a:pPr algn="ctr"/>
+                      <a:r>
+                        <a:rPr lang="en-US" dirty="0" smtClean="0"/>
+                        <a:t>36.2</a:t>
+                      </a:r>
+                      <a:endParaRPr lang="en-US" dirty="0"/>
+                    </a:p>
+                  </a:txBody>
+                  <a:tcPr anchor="ctr"/>
+                </a:tc>
+                <a:tc>
+                  <a:txBody>
+                    <a:bodyPr/>
+                    <a:lstStyle/>
+                    <a:p>
+                      <a:pPr algn="ctr"/>
+                      <a:r>
+                        <a:rPr lang="en-US" dirty="0" smtClean="0"/>
+                        <a:t>18.1</a:t>
+                      </a:r>
+                      <a:endParaRPr lang="en-US" dirty="0"/>
+                    </a:p>
+                  </a:txBody>
+                  <a:tcPr anchor="ctr"/>
+                </a:tc>
+              </a:tr>
+              <a:tr h="370840">
+                <a:tc>
+                  <a:txBody>
+                    <a:bodyPr/>
+                    <a:lstStyle/>
+                    <a:p>
+                      <a:pPr marL="0" marR="0" indent="0" algn="ctr" defTabSz="914400" rtl="0" eaLnBrk="1" fontAlgn="auto" latinLnBrk="0" hangingPunct="1">
+                        <a:lnSpc>
+                          <a:spcPct val="100000"/>
+                        </a:lnSpc>
+                        <a:spcBef>
+                          <a:spcPts val="0"/>
+                        </a:spcBef>
+                        <a:spcAft>
+                          <a:spcPts val="0"/>
+                        </a:spcAft>
+                        <a:buClrTx/>
+                        <a:buSzTx/>
+                        <a:buFontTx/>
+                        <a:buNone/>
+                        <a:tabLst/>
+                        <a:defRPr/>
+                      </a:pPr>
                       <a:r>
                         <a:rPr lang="en-US" dirty="0" smtClean="0"/>
                         <a:t>Occupancy</a:t>
                       </a:r>
-                    </a:p>
-                    <a:p>
-                      <a:pPr algn="ctr"/>
-                      <a:r>
-                        <a:rPr lang="en-US" dirty="0" smtClean="0"/>
-                        <a:t>75</a:t>
-                      </a:r>
                       <a:r>
                         <a:rPr lang="en-US" baseline="0" dirty="0" smtClean="0"/>
-                        <a:t> </a:t>
-                      </a:r>
-                      <a:r>
-                        <a:rPr lang="en-US" dirty="0" smtClean="0"/>
-                        <a:t>ns in %</a:t>
-                      </a:r>
-                      <a:endParaRPr lang="en-US" dirty="0"/>
-                    </a:p>
-                  </a:txBody>
-                  <a:tcPr anchor="ctr"/>
-                </a:tc>
-                <a:tc>
-                  <a:txBody>
-                    <a:bodyPr/>
-                    <a:lstStyle/>
-                    <a:p>
-                      <a:pPr algn="ctr"/>
-                      <a:r>
-                        <a:rPr lang="en-US" dirty="0" smtClean="0"/>
-                        <a:t>Channels firing</a:t>
-                      </a:r>
-                      <a:endParaRPr lang="en-US" dirty="0"/>
-                    </a:p>
-                  </a:txBody>
-                  <a:tcPr anchor="ctr"/>
-                </a:tc>
-                <a:tc>
-                  <a:txBody>
-                    <a:bodyPr/>
-                    <a:lstStyle/>
-                    <a:p>
-                      <a:pPr algn="ctr"/>
-                      <a:r>
-                        <a:rPr lang="en-US" dirty="0" smtClean="0"/>
-                        <a:t>Event size</a:t>
-                      </a:r>
-                    </a:p>
-                    <a:p>
-                      <a:pPr algn="ctr"/>
-                      <a:r>
-                        <a:rPr lang="en-US" dirty="0" smtClean="0"/>
-                        <a:t>(bytes)</a:t>
-                      </a:r>
-                      <a:endParaRPr lang="en-US" dirty="0"/>
-                    </a:p>
-                  </a:txBody>
-                  <a:tcPr anchor="ctr"/>
-                </a:tc>
-                <a:tc>
-                  <a:txBody>
-                    <a:bodyPr/>
-                    <a:lstStyle/>
-                    <a:p>
-                      <a:pPr algn="ctr"/>
-                      <a:r>
-                        <a:rPr lang="en-US" dirty="0" smtClean="0"/>
-                        <a:t>Data</a:t>
-                      </a:r>
-                      <a:r>
-                        <a:rPr lang="en-US" baseline="0" dirty="0" smtClean="0"/>
-                        <a:t> rate</a:t>
-                      </a:r>
-                    </a:p>
-                    <a:p>
-                      <a:pPr algn="ctr"/>
-                      <a:r>
-                        <a:rPr lang="en-US" baseline="0" dirty="0" smtClean="0"/>
-                        <a:t>5 KHz</a:t>
-                      </a:r>
-                    </a:p>
-                    <a:p>
-                      <a:pPr algn="ctr"/>
-                      <a:r>
-                        <a:rPr lang="en-US" baseline="0" dirty="0" smtClean="0"/>
-                        <a:t>MB/s</a:t>
-                      </a:r>
-                      <a:endParaRPr lang="en-US" dirty="0"/>
-                    </a:p>
-                  </a:txBody>
-                  <a:tcPr anchor="ctr"/>
-                </a:tc>
-              </a:tr>
-              <a:tr h="916607">
-                <a:tc>
-                  <a:txBody>
-                    <a:bodyPr/>
-                    <a:lstStyle/>
-                    <a:p>
-                      <a:pPr algn="ctr"/>
-                      <a:r>
-                        <a:rPr lang="en-US" dirty="0" smtClean="0"/>
-                        <a:t>Front tracker</a:t>
-                      </a:r>
-                      <a:endParaRPr lang="en-US" dirty="0"/>
-                    </a:p>
-                  </a:txBody>
-                  <a:tcPr anchor="ctr"/>
-                </a:tc>
-                <a:tc>
-                  <a:txBody>
-                    <a:bodyPr/>
-                    <a:lstStyle/>
-                    <a:p>
-                      <a:pPr algn="ctr"/>
-                      <a:r>
-                        <a:rPr lang="en-US" dirty="0" smtClean="0"/>
-                        <a:t>41,000</a:t>
-                      </a:r>
-                      <a:endParaRPr lang="en-US" dirty="0"/>
-                    </a:p>
-                  </a:txBody>
-                  <a:tcPr anchor="ctr"/>
-                </a:tc>
-                <a:tc>
-                  <a:txBody>
-                    <a:bodyPr/>
-                    <a:lstStyle/>
-                    <a:p>
-                      <a:pPr algn="ctr"/>
-                      <a:r>
-                        <a:rPr lang="en-US" dirty="0" smtClean="0"/>
-                        <a:t>3.3e9</a:t>
-                      </a:r>
-                      <a:endParaRPr lang="en-US" dirty="0"/>
-                    </a:p>
-                  </a:txBody>
-                  <a:tcPr anchor="ctr"/>
-                </a:tc>
-                <a:tc>
-                  <a:txBody>
-                    <a:bodyPr/>
-                    <a:lstStyle/>
-                    <a:p>
-                      <a:pPr algn="ctr"/>
-                      <a:r>
-                        <a:rPr lang="en-US" dirty="0" smtClean="0"/>
-                        <a:t>100</a:t>
-                      </a:r>
-                      <a:endParaRPr lang="en-US" dirty="0"/>
-                    </a:p>
-                  </a:txBody>
-                  <a:tcPr anchor="ctr"/>
-                </a:tc>
-                <a:tc>
-                  <a:txBody>
-                    <a:bodyPr/>
-                    <a:lstStyle/>
-                    <a:p>
-                      <a:pPr algn="ctr"/>
-                      <a:r>
-                        <a:rPr lang="en-US" dirty="0" smtClean="0"/>
-                        <a:t>41000</a:t>
-                      </a:r>
-                      <a:endParaRPr lang="en-US" dirty="0"/>
-                    </a:p>
-                  </a:txBody>
-                  <a:tcPr anchor="ctr"/>
-                </a:tc>
-                <a:tc>
-                  <a:txBody>
-                    <a:bodyPr/>
-                    <a:lstStyle/>
-                    <a:p>
-                      <a:pPr algn="ctr"/>
-                      <a:r>
-                        <a:rPr lang="en-US" dirty="0" smtClean="0"/>
-                        <a:t>79,200</a:t>
-                      </a:r>
-                      <a:endParaRPr lang="en-US" dirty="0"/>
-                    </a:p>
-                  </a:txBody>
-                  <a:tcPr anchor="ctr"/>
-                </a:tc>
-                <a:tc>
-                  <a:txBody>
-                    <a:bodyPr/>
-                    <a:lstStyle/>
-                    <a:p>
-                      <a:pPr algn="ctr"/>
-                      <a:r>
-                        <a:rPr lang="en-US" dirty="0" smtClean="0"/>
-                        <a:t>2000</a:t>
-                      </a:r>
-                      <a:endParaRPr lang="en-US" dirty="0"/>
-                    </a:p>
-                  </a:txBody>
-                  <a:tcPr anchor="ctr"/>
-                </a:tc>
-              </a:tr>
-              <a:tr h="664846">
-                <a:tc>
-                  <a:txBody>
-                    <a:bodyPr/>
-                    <a:lstStyle/>
-                    <a:p>
-                      <a:pPr algn="ctr"/>
-                      <a:r>
-                        <a:rPr lang="en-US" dirty="0" smtClean="0"/>
-                        <a:t>Back tracker</a:t>
-                      </a:r>
-                      <a:endParaRPr lang="en-US" dirty="0"/>
-                    </a:p>
-                  </a:txBody>
-                  <a:tcPr anchor="ctr"/>
-                </a:tc>
-                <a:tc>
-                  <a:txBody>
-                    <a:bodyPr/>
-                    <a:lstStyle/>
-                    <a:p>
-                      <a:pPr algn="ctr"/>
-                      <a:r>
-                        <a:rPr lang="en-US" dirty="0" smtClean="0"/>
-                        <a:t>112,640</a:t>
-                      </a:r>
-                      <a:endParaRPr lang="en-US" dirty="0"/>
-                    </a:p>
-                  </a:txBody>
-                  <a:tcPr anchor="ctr"/>
-                </a:tc>
-                <a:tc>
-                  <a:txBody>
-                    <a:bodyPr/>
-                    <a:lstStyle/>
-                    <a:p>
-                      <a:pPr algn="ctr"/>
-                      <a:r>
-                        <a:rPr lang="en-US" dirty="0" smtClean="0"/>
-                        <a:t>3.36e9</a:t>
-                      </a:r>
-                      <a:endParaRPr lang="en-US" dirty="0"/>
-                    </a:p>
-                  </a:txBody>
-                  <a:tcPr anchor="ctr"/>
-                </a:tc>
-                <a:tc>
-                  <a:txBody>
-                    <a:bodyPr/>
-                    <a:lstStyle/>
-                    <a:p>
-                      <a:pPr algn="ctr"/>
-                      <a:r>
-                        <a:rPr lang="en-US" dirty="0" smtClean="0"/>
-                        <a:t>37.3</a:t>
-                      </a:r>
-                      <a:endParaRPr lang="en-US" dirty="0"/>
-                    </a:p>
-                  </a:txBody>
-                  <a:tcPr anchor="ctr"/>
-                </a:tc>
-                <a:tc>
-                  <a:txBody>
-                    <a:bodyPr/>
-                    <a:lstStyle/>
-                    <a:p>
-                      <a:pPr algn="ctr"/>
-                      <a:r>
-                        <a:rPr lang="en-US" dirty="0" smtClean="0"/>
-                        <a:t>6720</a:t>
-                      </a:r>
-                      <a:endParaRPr lang="en-US" dirty="0"/>
-                    </a:p>
-                  </a:txBody>
-                  <a:tcPr anchor="ctr"/>
-                </a:tc>
-                <a:tc>
-                  <a:txBody>
-                    <a:bodyPr/>
-                    <a:lstStyle/>
-                    <a:p>
-                      <a:pPr algn="ctr"/>
-                      <a:r>
-                        <a:rPr lang="en-US" dirty="0" smtClean="0"/>
-                        <a:t>80,600</a:t>
-                      </a:r>
-                      <a:endParaRPr lang="en-US" dirty="0"/>
-                    </a:p>
-                  </a:txBody>
-                  <a:tcPr anchor="ctr"/>
-                </a:tc>
-                <a:tc>
-                  <a:txBody>
-                    <a:bodyPr/>
-                    <a:lstStyle/>
-                    <a:p>
-                      <a:pPr algn="ctr"/>
-                      <a:r>
-                        <a:rPr lang="en-US" dirty="0" smtClean="0"/>
-                        <a:t>2000</a:t>
-                      </a:r>
-                      <a:endParaRPr lang="en-US" dirty="0"/>
-                    </a:p>
-                  </a:txBody>
-                  <a:tcPr anchor="ctr"/>
-                </a:tc>
-              </a:tr>
-              <a:tr h="531050">
-                <a:tc>
-                  <a:txBody>
-                    <a:bodyPr/>
-                    <a:lstStyle/>
-                    <a:p>
-                      <a:pPr algn="ctr"/>
-                      <a:r>
-                        <a:rPr lang="en-US" dirty="0" err="1" smtClean="0"/>
-                        <a:t>HCal</a:t>
-                      </a:r>
-                      <a:endParaRPr lang="en-US" dirty="0"/>
-                    </a:p>
-                  </a:txBody>
-                  <a:tcPr anchor="ctr"/>
-                </a:tc>
-                <a:tc>
-                  <a:txBody>
-                    <a:bodyPr/>
-                    <a:lstStyle/>
-                    <a:p>
-                      <a:pPr algn="ctr"/>
-                      <a:r>
-                        <a:rPr lang="en-US" dirty="0" smtClean="0"/>
-                        <a:t>288</a:t>
-                      </a:r>
-                      <a:endParaRPr lang="en-US" dirty="0"/>
-                    </a:p>
-                  </a:txBody>
-                  <a:tcPr anchor="ctr"/>
-                </a:tc>
-                <a:tc>
-                  <a:txBody>
-                    <a:bodyPr/>
-                    <a:lstStyle/>
-                    <a:p>
-                      <a:pPr algn="ctr"/>
-                      <a:r>
-                        <a:rPr lang="en-US" dirty="0" smtClean="0"/>
-                        <a:t>_</a:t>
-                      </a:r>
-                      <a:endParaRPr lang="en-US" dirty="0"/>
-                    </a:p>
-                  </a:txBody>
-                  <a:tcPr anchor="ctr"/>
-                </a:tc>
-                <a:tc>
-                  <a:txBody>
-                    <a:bodyPr/>
-                    <a:lstStyle/>
-                    <a:p>
-                      <a:pPr algn="ctr"/>
-                      <a:r>
-                        <a:rPr lang="en-US" dirty="0" smtClean="0"/>
-                        <a:t>100</a:t>
-                      </a:r>
-                      <a:endParaRPr lang="en-US" dirty="0"/>
-                    </a:p>
-                  </a:txBody>
-                  <a:tcPr anchor="ctr"/>
-                </a:tc>
-                <a:tc>
-                  <a:txBody>
-                    <a:bodyPr/>
-                    <a:lstStyle/>
-                    <a:p>
-                      <a:pPr algn="ctr"/>
-                      <a:r>
-                        <a:rPr lang="en-US" dirty="0" smtClean="0"/>
-                        <a:t>288</a:t>
-                      </a:r>
-                      <a:endParaRPr lang="en-US" dirty="0"/>
-                    </a:p>
-                  </a:txBody>
-                  <a:tcPr anchor="ctr"/>
-                </a:tc>
-                <a:tc>
-                  <a:txBody>
-                    <a:bodyPr/>
-                    <a:lstStyle/>
-                    <a:p>
-                      <a:pPr algn="ctr"/>
-                      <a:r>
-                        <a:rPr lang="en-US" dirty="0" smtClean="0"/>
-                        <a:t>5,904</a:t>
-                      </a:r>
-                      <a:endParaRPr lang="en-US" dirty="0"/>
-                    </a:p>
-                  </a:txBody>
-                  <a:tcPr anchor="ctr"/>
-                </a:tc>
-                <a:tc>
-                  <a:txBody>
-                    <a:bodyPr/>
-                    <a:lstStyle/>
-                    <a:p>
-                      <a:pPr algn="ctr"/>
-                      <a:r>
-                        <a:rPr lang="en-US" dirty="0" smtClean="0"/>
-                        <a:t>30</a:t>
-                      </a:r>
-                      <a:endParaRPr lang="en-US" dirty="0"/>
-                    </a:p>
-                  </a:txBody>
-                  <a:tcPr anchor="ctr"/>
-                </a:tc>
-              </a:tr>
-              <a:tr h="531050">
-                <a:tc>
-                  <a:txBody>
-                    <a:bodyPr/>
-                    <a:lstStyle/>
-                    <a:p>
-                      <a:pPr algn="ctr"/>
-                      <a:r>
-                        <a:rPr lang="en-US" dirty="0" smtClean="0"/>
-                        <a:t>ECAL</a:t>
-                      </a:r>
-                      <a:endParaRPr lang="en-US" dirty="0"/>
-                    </a:p>
-                  </a:txBody>
-                  <a:tcPr anchor="ctr"/>
-                </a:tc>
-                <a:tc>
-                  <a:txBody>
-                    <a:bodyPr/>
-                    <a:lstStyle/>
-                    <a:p>
-                      <a:pPr algn="ctr"/>
-                      <a:r>
-                        <a:rPr lang="en-US" dirty="0" smtClean="0"/>
-                        <a:t>1800 + 225 </a:t>
-                      </a:r>
-                      <a:endParaRPr lang="en-US" dirty="0"/>
-                    </a:p>
-                  </a:txBody>
-                  <a:tcPr anchor="ctr"/>
-                </a:tc>
-                <a:tc>
-                  <a:txBody>
-                    <a:bodyPr/>
-                    <a:lstStyle/>
-                    <a:p>
-                      <a:pPr algn="ctr"/>
-                      <a:r>
-                        <a:rPr lang="en-US" dirty="0" smtClean="0"/>
-                        <a:t>_</a:t>
-                      </a:r>
-                      <a:endParaRPr lang="en-US" dirty="0"/>
-                    </a:p>
-                  </a:txBody>
-                  <a:tcPr anchor="ctr"/>
-                </a:tc>
-                <a:tc>
-                  <a:txBody>
-                    <a:bodyPr/>
-                    <a:lstStyle/>
-                    <a:p>
-                      <a:pPr algn="ctr"/>
-                      <a:r>
-                        <a:rPr lang="en-US" dirty="0" smtClean="0"/>
-                        <a:t>100</a:t>
-                      </a:r>
-                      <a:endParaRPr lang="en-US" dirty="0"/>
-                    </a:p>
-                  </a:txBody>
-                  <a:tcPr anchor="ctr"/>
-                </a:tc>
-                <a:tc>
-                  <a:txBody>
-                    <a:bodyPr/>
-                    <a:lstStyle/>
-                    <a:p>
-                      <a:pPr algn="ctr"/>
-                      <a:r>
-                        <a:rPr lang="en-US" dirty="0" smtClean="0"/>
-                        <a:t>2025</a:t>
-                      </a:r>
-                      <a:endParaRPr lang="en-US" dirty="0"/>
-                    </a:p>
-                  </a:txBody>
-                  <a:tcPr anchor="ctr"/>
-                </a:tc>
-                <a:tc>
-                  <a:txBody>
-                    <a:bodyPr/>
-                    <a:lstStyle/>
-                    <a:p>
-                      <a:pPr algn="ctr"/>
-                      <a:r>
-                        <a:rPr lang="en-US" dirty="0" smtClean="0"/>
-                        <a:t>8,100</a:t>
-                      </a:r>
-                      <a:endParaRPr lang="en-US" dirty="0"/>
-                    </a:p>
-                  </a:txBody>
-                  <a:tcPr anchor="ctr"/>
-                </a:tc>
-                <a:tc>
-                  <a:txBody>
-                    <a:bodyPr/>
-                    <a:lstStyle/>
-                    <a:p>
-                      <a:pPr algn="ctr"/>
-                      <a:r>
-                        <a:rPr lang="en-US" dirty="0" smtClean="0"/>
-                        <a:t>45</a:t>
-                      </a:r>
-                      <a:endParaRPr lang="en-US" dirty="0"/>
-                    </a:p>
-                  </a:txBody>
-                  <a:tcPr anchor="ctr"/>
-                </a:tc>
-              </a:tr>
-              <a:tr h="531050">
-                <a:tc>
-                  <a:txBody>
-                    <a:bodyPr/>
-                    <a:lstStyle/>
-                    <a:p>
-                      <a:pPr algn="ctr"/>
-                      <a:r>
-                        <a:rPr lang="en-US" dirty="0" smtClean="0"/>
-                        <a:t>CDET</a:t>
-                      </a:r>
-                      <a:endParaRPr lang="en-US" dirty="0"/>
-                    </a:p>
-                  </a:txBody>
-                  <a:tcPr anchor="ctr"/>
-                </a:tc>
-                <a:tc>
-                  <a:txBody>
-                    <a:bodyPr/>
-                    <a:lstStyle/>
-                    <a:p>
-                      <a:pPr algn="ctr"/>
-                      <a:r>
-                        <a:rPr lang="en-US" dirty="0" smtClean="0"/>
-                        <a:t>2152</a:t>
-                      </a:r>
-                      <a:endParaRPr lang="en-US" dirty="0"/>
-                    </a:p>
-                  </a:txBody>
-                  <a:tcPr anchor="ctr"/>
-                </a:tc>
-                <a:tc>
-                  <a:txBody>
-                    <a:bodyPr/>
-                    <a:lstStyle/>
-                    <a:p>
-                      <a:pPr algn="ctr"/>
-                      <a:r>
-                        <a:rPr lang="en-US" dirty="0" smtClean="0"/>
-                        <a:t>_</a:t>
-                      </a:r>
-                      <a:endParaRPr lang="en-US" dirty="0"/>
-                    </a:p>
-                  </a:txBody>
-                  <a:tcPr anchor="ctr"/>
-                </a:tc>
-                <a:tc>
-                  <a:txBody>
-                    <a:bodyPr/>
-                    <a:lstStyle/>
-                    <a:p>
-                      <a:pPr algn="ctr"/>
-                      <a:r>
-                        <a:rPr lang="en-US" dirty="0" smtClean="0"/>
-                        <a:t>10</a:t>
-                      </a:r>
-                      <a:endParaRPr lang="en-US" dirty="0"/>
-                    </a:p>
-                  </a:txBody>
-                  <a:tcPr anchor="ctr"/>
-                </a:tc>
-                <a:tc>
-                  <a:txBody>
-                    <a:bodyPr/>
-                    <a:lstStyle/>
-                    <a:p>
-                      <a:pPr algn="ctr"/>
-                      <a:r>
-                        <a:rPr lang="en-US" dirty="0" smtClean="0"/>
-                        <a:t>216</a:t>
-                      </a:r>
-                      <a:endParaRPr lang="en-US" dirty="0"/>
-                    </a:p>
-                  </a:txBody>
-                  <a:tcPr anchor="ctr"/>
-                </a:tc>
-                <a:tc>
-                  <a:txBody>
-                    <a:bodyPr/>
-                    <a:lstStyle/>
-                    <a:p>
-                      <a:pPr algn="ctr"/>
-                      <a:r>
-                        <a:rPr lang="en-US" dirty="0" smtClean="0"/>
-                        <a:t>864</a:t>
-                      </a:r>
-                      <a:endParaRPr lang="en-US" dirty="0"/>
-                    </a:p>
-                  </a:txBody>
-                  <a:tcPr anchor="ctr"/>
-                </a:tc>
-                <a:tc>
-                  <a:txBody>
-                    <a:bodyPr/>
-                    <a:lstStyle/>
-                    <a:p>
-                      <a:pPr algn="ctr"/>
-                      <a:r>
-                        <a:rPr lang="en-US" dirty="0" smtClean="0"/>
-                        <a:t>4.3</a:t>
+                        <a:t> back tracker</a:t>
+                      </a:r>
+                      <a:endParaRPr lang="en-US" dirty="0" smtClean="0"/>
+                    </a:p>
+                    <a:p>
+                      <a:pPr algn="ctr"/>
+                      <a:r>
+                        <a:rPr lang="en-US" dirty="0" smtClean="0"/>
+                        <a:t>In %</a:t>
+                      </a:r>
+                      <a:endParaRPr lang="en-US" dirty="0"/>
+                    </a:p>
+                  </a:txBody>
+                  <a:tcPr anchor="ctr"/>
+                </a:tc>
+                <a:tc>
+                  <a:txBody>
+                    <a:bodyPr/>
+                    <a:lstStyle/>
+                    <a:p>
+                      <a:pPr algn="ctr"/>
+                      <a:r>
+                        <a:rPr lang="en-US" dirty="0" smtClean="0"/>
+                        <a:t>22.4</a:t>
+                      </a:r>
+                      <a:endParaRPr lang="en-US" dirty="0"/>
+                    </a:p>
+                  </a:txBody>
+                  <a:tcPr anchor="ctr"/>
+                </a:tc>
+                <a:tc>
+                  <a:txBody>
+                    <a:bodyPr/>
+                    <a:lstStyle/>
+                    <a:p>
+                      <a:pPr algn="ctr"/>
+                      <a:r>
+                        <a:rPr lang="en-US" dirty="0" smtClean="0"/>
+                        <a:t>11.2</a:t>
                       </a:r>
                       <a:endParaRPr lang="en-US" dirty="0"/>
                     </a:p>
@@ -9497,10 +8908,90 @@
           </a:graphicData>
         </a:graphic>
       </p:graphicFrame>
+      <p:sp>
+        <p:nvSpPr>
+          <p:cNvPr id="18" name="TextBox 17"/>
+          <p:cNvSpPr txBox="1"/>
+          <p:nvPr/>
+        </p:nvSpPr>
+        <p:spPr>
+          <a:xfrm>
+            <a:off x="6784074" y="4691122"/>
+            <a:ext cx="1978925" cy="1754326"/>
+          </a:xfrm>
+          <a:prstGeom prst="rect">
+            <a:avLst/>
+          </a:prstGeom>
+          <a:noFill/>
+          <a:ln>
+            <a:solidFill>
+              <a:schemeClr val="tx1"/>
+            </a:solidFill>
+          </a:ln>
+        </p:spPr>
+        <p:txBody>
+          <a:bodyPr wrap="square" rtlCol="0">
+            <a:spAutoFit/>
+          </a:bodyPr>
+          <a:lstStyle/>
+          <a:p>
+            <a:pPr algn="ctr"/>
+            <a:r>
+              <a:rPr lang="en-US" dirty="0" smtClean="0"/>
+              <a:t>Need to test clustering and correlations </a:t>
+            </a:r>
+            <a:r>
+              <a:rPr lang="en-US" dirty="0" err="1" smtClean="0"/>
+              <a:t>betweens</a:t>
+            </a:r>
+            <a:r>
+              <a:rPr lang="en-US" dirty="0" smtClean="0"/>
+              <a:t> planes for further reduction</a:t>
+            </a:r>
+            <a:endParaRPr lang="en-US" dirty="0" smtClean="0"/>
+          </a:p>
+        </p:txBody>
+      </p:sp>
+      <p:sp>
+        <p:nvSpPr>
+          <p:cNvPr id="19" name="TextBox 18"/>
+          <p:cNvSpPr txBox="1"/>
+          <p:nvPr/>
+        </p:nvSpPr>
+        <p:spPr>
+          <a:xfrm>
+            <a:off x="549572" y="4321790"/>
+            <a:ext cx="2903808" cy="369332"/>
+          </a:xfrm>
+          <a:prstGeom prst="rect">
+            <a:avLst/>
+          </a:prstGeom>
+          <a:noFill/>
+          <a:ln>
+            <a:solidFill>
+              <a:schemeClr val="tx1"/>
+            </a:solidFill>
+          </a:ln>
+        </p:spPr>
+        <p:txBody>
+          <a:bodyPr wrap="none" rtlCol="0">
+            <a:spAutoFit/>
+          </a:bodyPr>
+          <a:lstStyle/>
+          <a:p>
+            <a:pPr algn="ctr"/>
+            <a:r>
+              <a:rPr lang="en-US" dirty="0" smtClean="0"/>
+              <a:t>Assume 2.5 strips cluster size</a:t>
+            </a:r>
+            <a:endParaRPr lang="en-US" dirty="0" smtClean="0"/>
+          </a:p>
+        </p:txBody>
+      </p:sp>
     </p:spTree>
     <p:extLst>
       <p:ext uri="{BB962C8B-B14F-4D97-AF65-F5344CB8AC3E}">
-        <p14:creationId xmlns:p14="http://schemas.microsoft.com/office/powerpoint/2010/main" val="3262699726"/>
+        <p14:creationId xmlns:p14="http://schemas.microsoft.com/office/powerpoint/2010/main" val="2578674691"/>
       </p:ext>
     </p:extLst>
   </p:cSld>
@@ -9539,829 +9030,6 @@
         </p:nvSpPr>
         <p:spPr/>
         <p:txBody>
-          <a:bodyPr/>
-          <a:lstStyle/>
-          <a:p>
-            <a:r>
-              <a:rPr lang="en-US" dirty="0" smtClean="0"/>
-              <a:t>GEM data flow </a:t>
-            </a:r>
-            <a:r>
-              <a:rPr lang="en-US" dirty="0" err="1" smtClean="0"/>
-              <a:t>GEp</a:t>
-            </a:r>
-            <a:endParaRPr lang="en-US" dirty="0"/>
-          </a:p>
-        </p:txBody>
-      </p:sp>
-      <p:sp>
-        <p:nvSpPr>
-          <p:cNvPr id="4" name="TextBox 3"/>
-          <p:cNvSpPr txBox="1"/>
-          <p:nvPr/>
-        </p:nvSpPr>
-        <p:spPr>
-          <a:xfrm>
-            <a:off x="221776" y="2439623"/>
-            <a:ext cx="1143000" cy="923330"/>
-          </a:xfrm>
-          <a:prstGeom prst="rect">
-            <a:avLst/>
-          </a:prstGeom>
-          <a:noFill/>
-          <a:ln>
-            <a:solidFill>
-              <a:schemeClr val="tx1"/>
-            </a:solidFill>
-          </a:ln>
-        </p:spPr>
-        <p:txBody>
-          <a:bodyPr wrap="square" rtlCol="0">
-            <a:spAutoFit/>
-          </a:bodyPr>
-          <a:lstStyle/>
-          <a:p>
-            <a:pPr algn="ctr"/>
-            <a:r>
-              <a:rPr lang="en-US" dirty="0" smtClean="0"/>
-              <a:t>GEM</a:t>
-            </a:r>
-          </a:p>
-          <a:p>
-            <a:pPr algn="ctr"/>
-            <a:r>
-              <a:rPr lang="en-US" dirty="0" smtClean="0"/>
-              <a:t>153 640</a:t>
-            </a:r>
-          </a:p>
-          <a:p>
-            <a:pPr algn="ctr"/>
-            <a:r>
-              <a:rPr lang="en-US" dirty="0" smtClean="0"/>
-              <a:t>strips</a:t>
-            </a:r>
-            <a:r>
-              <a:rPr lang="en-US" dirty="0" smtClean="0"/>
-              <a:t> </a:t>
-            </a:r>
-            <a:endParaRPr lang="en-US" dirty="0" smtClean="0"/>
-          </a:p>
-        </p:txBody>
-      </p:sp>
-      <p:sp>
-        <p:nvSpPr>
-          <p:cNvPr id="5" name="Right Arrow 4"/>
-          <p:cNvSpPr/>
-          <p:nvPr/>
-        </p:nvSpPr>
-        <p:spPr>
-          <a:xfrm>
-            <a:off x="1447800" y="2710788"/>
-            <a:ext cx="914400" cy="381000"/>
-          </a:xfrm>
-          <a:prstGeom prst="rightArrow">
-            <a:avLst/>
-          </a:prstGeom>
-        </p:spPr>
-        <p:style>
-          <a:lnRef idx="2">
-            <a:schemeClr val="accent1">
-              <a:shade val="50000"/>
-            </a:schemeClr>
-          </a:lnRef>
-          <a:fillRef idx="1">
-            <a:schemeClr val="accent1"/>
-          </a:fillRef>
-          <a:effectRef idx="0">
-            <a:schemeClr val="accent1"/>
-          </a:effectRef>
-          <a:fontRef idx="minor">
-            <a:schemeClr val="lt1"/>
-          </a:fontRef>
-        </p:style>
-        <p:txBody>
-          <a:bodyPr rtlCol="0" anchor="ctr"/>
-          <a:lstStyle/>
-          <a:p>
-            <a:pPr algn="ctr"/>
-            <a:endParaRPr lang="en-US"/>
-          </a:p>
-        </p:txBody>
-      </p:sp>
-      <p:sp>
-        <p:nvSpPr>
-          <p:cNvPr id="7" name="TextBox 6"/>
-          <p:cNvSpPr txBox="1"/>
-          <p:nvPr/>
-        </p:nvSpPr>
-        <p:spPr>
-          <a:xfrm>
-            <a:off x="2362200" y="1828802"/>
-            <a:ext cx="1676400" cy="2308324"/>
-          </a:xfrm>
-          <a:prstGeom prst="rect">
-            <a:avLst/>
-          </a:prstGeom>
-          <a:noFill/>
-          <a:ln>
-            <a:solidFill>
-              <a:schemeClr val="tx1"/>
-            </a:solidFill>
-          </a:ln>
-        </p:spPr>
-        <p:txBody>
-          <a:bodyPr wrap="square" rtlCol="0">
-            <a:spAutoFit/>
-          </a:bodyPr>
-          <a:lstStyle/>
-          <a:p>
-            <a:pPr algn="ctr"/>
-            <a:r>
-              <a:rPr lang="en-US" dirty="0" smtClean="0"/>
-              <a:t>MPD</a:t>
-            </a:r>
-          </a:p>
-          <a:p>
-            <a:pPr algn="ctr"/>
-            <a:r>
-              <a:rPr lang="en-US" dirty="0" smtClean="0"/>
-              <a:t>153 640</a:t>
-            </a:r>
-          </a:p>
-          <a:p>
-            <a:pPr algn="ctr"/>
-            <a:r>
-              <a:rPr lang="en-US" dirty="0" smtClean="0"/>
-              <a:t>X 6 samples x 3 bytes</a:t>
-            </a:r>
-          </a:p>
-          <a:p>
-            <a:pPr algn="ctr"/>
-            <a:r>
-              <a:rPr lang="en-US" dirty="0" smtClean="0"/>
-              <a:t>FT=5.99 GB/s</a:t>
-            </a:r>
-          </a:p>
-          <a:p>
-            <a:pPr algn="ctr"/>
-            <a:r>
-              <a:rPr lang="en-US" dirty="0" smtClean="0"/>
-              <a:t>BT=10.2 GB/s</a:t>
-            </a:r>
-          </a:p>
-          <a:p>
-            <a:pPr algn="ctr"/>
-            <a:r>
-              <a:rPr lang="en-US" dirty="0" smtClean="0"/>
-              <a:t>Total= 16.2 GB/s</a:t>
-            </a:r>
-          </a:p>
-        </p:txBody>
-      </p:sp>
-      <p:sp>
-        <p:nvSpPr>
-          <p:cNvPr id="8" name="TextBox 7"/>
-          <p:cNvSpPr txBox="1"/>
-          <p:nvPr/>
-        </p:nvSpPr>
-        <p:spPr>
-          <a:xfrm>
-            <a:off x="3618487" y="1219200"/>
-            <a:ext cx="1813766" cy="369332"/>
-          </a:xfrm>
-          <a:prstGeom prst="rect">
-            <a:avLst/>
-          </a:prstGeom>
-          <a:noFill/>
-          <a:ln>
-            <a:noFill/>
-          </a:ln>
-        </p:spPr>
-        <p:txBody>
-          <a:bodyPr wrap="none" rtlCol="0">
-            <a:spAutoFit/>
-          </a:bodyPr>
-          <a:lstStyle/>
-          <a:p>
-            <a:pPr algn="ctr"/>
-            <a:r>
-              <a:rPr lang="en-US" dirty="0" smtClean="0"/>
-              <a:t>5 KHz trigger rate</a:t>
-            </a:r>
-            <a:endParaRPr lang="en-US" dirty="0" smtClean="0"/>
-          </a:p>
-        </p:txBody>
-      </p:sp>
-      <p:sp>
-        <p:nvSpPr>
-          <p:cNvPr id="10" name="TextBox 9"/>
-          <p:cNvSpPr txBox="1"/>
-          <p:nvPr/>
-        </p:nvSpPr>
-        <p:spPr>
-          <a:xfrm>
-            <a:off x="4521511" y="1828800"/>
-            <a:ext cx="1805364" cy="2862322"/>
-          </a:xfrm>
-          <a:prstGeom prst="rect">
-            <a:avLst/>
-          </a:prstGeom>
-          <a:noFill/>
-          <a:ln>
-            <a:solidFill>
-              <a:schemeClr val="tx1"/>
-            </a:solidFill>
-          </a:ln>
-        </p:spPr>
-        <p:txBody>
-          <a:bodyPr wrap="square" rtlCol="0">
-            <a:spAutoFit/>
-          </a:bodyPr>
-          <a:lstStyle/>
-          <a:p>
-            <a:pPr algn="ctr"/>
-            <a:r>
-              <a:rPr lang="en-US" dirty="0" smtClean="0"/>
-              <a:t>MPD</a:t>
-            </a:r>
-          </a:p>
-          <a:p>
-            <a:pPr algn="ctr"/>
-            <a:r>
-              <a:rPr lang="en-US" dirty="0" smtClean="0"/>
-              <a:t>Zero suppress</a:t>
-            </a:r>
-          </a:p>
-          <a:p>
-            <a:pPr algn="ctr"/>
-            <a:r>
-              <a:rPr lang="en-US" dirty="0"/>
-              <a:t>FT=5.99 GB/s</a:t>
-            </a:r>
-          </a:p>
-          <a:p>
-            <a:pPr algn="ctr"/>
-            <a:r>
-              <a:rPr lang="en-US" dirty="0" smtClean="0"/>
-              <a:t>BT=6.14 GB/s</a:t>
-            </a:r>
-            <a:endParaRPr lang="en-US" dirty="0" smtClean="0"/>
-          </a:p>
-          <a:p>
-            <a:pPr algn="ctr"/>
-            <a:r>
-              <a:rPr lang="en-US" dirty="0" smtClean="0"/>
-              <a:t>Geometrical cut (factor 3)</a:t>
-            </a:r>
-          </a:p>
-          <a:p>
-            <a:pPr algn="ctr"/>
-            <a:r>
-              <a:rPr lang="en-US" dirty="0" smtClean="0"/>
-              <a:t>FT=2 </a:t>
-            </a:r>
-            <a:r>
-              <a:rPr lang="en-US" dirty="0"/>
-              <a:t>GB/s</a:t>
-            </a:r>
-          </a:p>
-          <a:p>
-            <a:pPr algn="ctr"/>
-            <a:r>
-              <a:rPr lang="en-US" dirty="0" smtClean="0"/>
-              <a:t>BT=2 GB/s</a:t>
-            </a:r>
-            <a:endParaRPr lang="en-US" dirty="0"/>
-          </a:p>
-          <a:p>
-            <a:pPr algn="ctr"/>
-            <a:endParaRPr lang="en-US" dirty="0" smtClean="0"/>
-          </a:p>
-          <a:p>
-            <a:pPr algn="ctr"/>
-            <a:endParaRPr lang="en-US" dirty="0" smtClean="0"/>
-          </a:p>
-        </p:txBody>
-      </p:sp>
-      <p:sp>
-        <p:nvSpPr>
-          <p:cNvPr id="11" name="Right Arrow 10"/>
-          <p:cNvSpPr/>
-          <p:nvPr/>
-        </p:nvSpPr>
-        <p:spPr>
-          <a:xfrm>
-            <a:off x="4068170" y="2710788"/>
-            <a:ext cx="457200" cy="381000"/>
-          </a:xfrm>
-          <a:prstGeom prst="rightArrow">
-            <a:avLst/>
-          </a:prstGeom>
-        </p:spPr>
-        <p:style>
-          <a:lnRef idx="2">
-            <a:schemeClr val="accent1">
-              <a:shade val="50000"/>
-            </a:schemeClr>
-          </a:lnRef>
-          <a:fillRef idx="1">
-            <a:schemeClr val="accent1"/>
-          </a:fillRef>
-          <a:effectRef idx="0">
-            <a:schemeClr val="accent1"/>
-          </a:effectRef>
-          <a:fontRef idx="minor">
-            <a:schemeClr val="lt1"/>
-          </a:fontRef>
-        </p:style>
-        <p:txBody>
-          <a:bodyPr rtlCol="0" anchor="ctr"/>
-          <a:lstStyle/>
-          <a:p>
-            <a:pPr algn="ctr"/>
-            <a:endParaRPr lang="en-US"/>
-          </a:p>
-        </p:txBody>
-      </p:sp>
-      <p:sp>
-        <p:nvSpPr>
-          <p:cNvPr id="12" name="TextBox 11"/>
-          <p:cNvSpPr txBox="1"/>
-          <p:nvPr/>
-        </p:nvSpPr>
-        <p:spPr>
-          <a:xfrm>
-            <a:off x="1447800" y="2070291"/>
-            <a:ext cx="833883" cy="369332"/>
-          </a:xfrm>
-          <a:prstGeom prst="rect">
-            <a:avLst/>
-          </a:prstGeom>
-          <a:noFill/>
-          <a:ln>
-            <a:solidFill>
-              <a:schemeClr val="tx1"/>
-            </a:solidFill>
-          </a:ln>
-        </p:spPr>
-        <p:txBody>
-          <a:bodyPr wrap="none" rtlCol="0">
-            <a:spAutoFit/>
-          </a:bodyPr>
-          <a:lstStyle/>
-          <a:p>
-            <a:pPr algn="ctr"/>
-            <a:r>
-              <a:rPr lang="en-US" dirty="0" smtClean="0"/>
-              <a:t>Analog</a:t>
-            </a:r>
-            <a:endParaRPr lang="en-US" dirty="0" smtClean="0"/>
-          </a:p>
-        </p:txBody>
-      </p:sp>
-      <p:sp>
-        <p:nvSpPr>
-          <p:cNvPr id="14" name="TextBox 13"/>
-          <p:cNvSpPr txBox="1"/>
-          <p:nvPr/>
-        </p:nvSpPr>
-        <p:spPr>
-          <a:xfrm>
-            <a:off x="6705600" y="1828800"/>
-            <a:ext cx="1600200" cy="2862322"/>
-          </a:xfrm>
-          <a:prstGeom prst="rect">
-            <a:avLst/>
-          </a:prstGeom>
-          <a:noFill/>
-          <a:ln>
-            <a:solidFill>
-              <a:schemeClr val="tx1"/>
-            </a:solidFill>
-          </a:ln>
-        </p:spPr>
-        <p:txBody>
-          <a:bodyPr wrap="square" rtlCol="0">
-            <a:spAutoFit/>
-          </a:bodyPr>
-          <a:lstStyle/>
-          <a:p>
-            <a:pPr algn="ctr"/>
-            <a:r>
-              <a:rPr lang="en-US" dirty="0" smtClean="0"/>
-              <a:t>SSP</a:t>
-            </a:r>
-          </a:p>
-          <a:p>
-            <a:pPr algn="ctr"/>
-            <a:r>
-              <a:rPr lang="en-US" dirty="0" smtClean="0"/>
-              <a:t> Deconvolution</a:t>
-            </a:r>
-          </a:p>
-          <a:p>
-            <a:pPr algn="ctr"/>
-            <a:r>
-              <a:rPr lang="en-US" dirty="0" smtClean="0"/>
-              <a:t>( factor 3)</a:t>
-            </a:r>
-          </a:p>
-          <a:p>
-            <a:pPr algn="ctr"/>
-            <a:r>
-              <a:rPr lang="en-US" dirty="0" smtClean="0"/>
-              <a:t>FT=0.7 </a:t>
-            </a:r>
-            <a:r>
-              <a:rPr lang="en-US" dirty="0"/>
-              <a:t>GB/s</a:t>
-            </a:r>
-          </a:p>
-          <a:p>
-            <a:pPr algn="ctr"/>
-            <a:r>
-              <a:rPr lang="en-US" dirty="0" smtClean="0"/>
-              <a:t>BT=0.7 GB/s</a:t>
-            </a:r>
-          </a:p>
-          <a:p>
-            <a:pPr algn="ctr"/>
-            <a:r>
-              <a:rPr lang="en-US" dirty="0" smtClean="0"/>
-              <a:t>Zero suppress</a:t>
-            </a:r>
-          </a:p>
-          <a:p>
-            <a:pPr algn="ctr"/>
-            <a:r>
-              <a:rPr lang="en-US" dirty="0" smtClean="0"/>
-              <a:t>FT=0.21 </a:t>
-            </a:r>
-            <a:r>
-              <a:rPr lang="en-US" dirty="0"/>
-              <a:t>GB/s</a:t>
-            </a:r>
-          </a:p>
-          <a:p>
-            <a:pPr algn="ctr"/>
-            <a:r>
-              <a:rPr lang="en-US" dirty="0" smtClean="0"/>
-              <a:t>BT=0.07 GB/s</a:t>
-            </a:r>
-          </a:p>
-          <a:p>
-            <a:pPr algn="ctr"/>
-            <a:r>
-              <a:rPr lang="en-US" dirty="0" smtClean="0"/>
-              <a:t>Total</a:t>
-            </a:r>
-          </a:p>
-          <a:p>
-            <a:pPr algn="ctr"/>
-            <a:r>
-              <a:rPr lang="en-US" smtClean="0"/>
-              <a:t>280 MB/s</a:t>
-            </a:r>
-            <a:endParaRPr lang="en-US" dirty="0" smtClean="0"/>
-          </a:p>
-        </p:txBody>
-      </p:sp>
-      <p:sp>
-        <p:nvSpPr>
-          <p:cNvPr id="15" name="Right Arrow 14"/>
-          <p:cNvSpPr/>
-          <p:nvPr/>
-        </p:nvSpPr>
-        <p:spPr>
-          <a:xfrm>
-            <a:off x="6326875" y="2672688"/>
-            <a:ext cx="457200" cy="381000"/>
-          </a:xfrm>
-          <a:prstGeom prst="rightArrow">
-            <a:avLst/>
-          </a:prstGeom>
-        </p:spPr>
-        <p:style>
-          <a:lnRef idx="2">
-            <a:schemeClr val="accent1">
-              <a:shade val="50000"/>
-            </a:schemeClr>
-          </a:lnRef>
-          <a:fillRef idx="1">
-            <a:schemeClr val="accent1"/>
-          </a:fillRef>
-          <a:effectRef idx="0">
-            <a:schemeClr val="accent1"/>
-          </a:effectRef>
-          <a:fontRef idx="minor">
-            <a:schemeClr val="lt1"/>
-          </a:fontRef>
-        </p:style>
-        <p:txBody>
-          <a:bodyPr rtlCol="0" anchor="ctr"/>
-          <a:lstStyle/>
-          <a:p>
-            <a:pPr algn="ctr"/>
-            <a:endParaRPr lang="en-US"/>
-          </a:p>
-        </p:txBody>
-      </p:sp>
-      <p:graphicFrame>
-        <p:nvGraphicFramePr>
-          <p:cNvPr id="17" name="Table 16"/>
-          <p:cNvGraphicFramePr>
-            <a:graphicFrameLocks noGrp="1"/>
-          </p:cNvGraphicFramePr>
-          <p:nvPr>
-            <p:extLst>
-              <p:ext uri="{D42A27DB-BD31-4B8C-83A1-F6EECF244321}">
-                <p14:modId xmlns:p14="http://schemas.microsoft.com/office/powerpoint/2010/main" val="1844684809"/>
-              </p:ext>
-            </p:extLst>
-          </p:nvPr>
-        </p:nvGraphicFramePr>
-        <p:xfrm>
-          <a:off x="304800" y="4800600"/>
-          <a:ext cx="6288659" cy="1737360"/>
-        </p:xfrm>
-        <a:graphic>
-          <a:graphicData uri="http://schemas.openxmlformats.org/drawingml/2006/table">
-            <a:tbl>
-              <a:tblPr firstRow="1" bandRow="1">
-                <a:tableStyleId>{5C22544A-7EE6-4342-B048-85BDC9FD1C3A}</a:tableStyleId>
-              </a:tblPr>
-              <a:tblGrid>
-                <a:gridCol w="2587456"/>
-                <a:gridCol w="1790905"/>
-                <a:gridCol w="1910298"/>
-              </a:tblGrid>
-              <a:tr h="457200">
-                <a:tc>
-                  <a:txBody>
-                    <a:bodyPr/>
-                    <a:lstStyle/>
-                    <a:p>
-                      <a:pPr algn="ctr"/>
-                      <a:r>
-                        <a:rPr lang="en-US" dirty="0" smtClean="0"/>
-                        <a:t>Time window</a:t>
-                      </a:r>
-                      <a:endParaRPr lang="en-US" dirty="0"/>
-                    </a:p>
-                  </a:txBody>
-                  <a:tcPr/>
-                </a:tc>
-                <a:tc>
-                  <a:txBody>
-                    <a:bodyPr/>
-                    <a:lstStyle/>
-                    <a:p>
-                      <a:pPr algn="ctr"/>
-                      <a:r>
-                        <a:rPr lang="en-US" dirty="0" smtClean="0"/>
-                        <a:t>6x25</a:t>
-                      </a:r>
-                      <a:r>
-                        <a:rPr lang="en-US" baseline="0" dirty="0" smtClean="0"/>
-                        <a:t> ns</a:t>
-                      </a:r>
-                      <a:endParaRPr lang="en-US" dirty="0"/>
-                    </a:p>
-                  </a:txBody>
-                  <a:tcPr/>
-                </a:tc>
-                <a:tc>
-                  <a:txBody>
-                    <a:bodyPr/>
-                    <a:lstStyle/>
-                    <a:p>
-                      <a:pPr algn="ctr"/>
-                      <a:r>
-                        <a:rPr lang="en-US" dirty="0" smtClean="0"/>
-                        <a:t>3x25 ns</a:t>
-                      </a:r>
-                      <a:endParaRPr lang="en-US" dirty="0"/>
-                    </a:p>
-                  </a:txBody>
-                  <a:tcPr/>
-                </a:tc>
-              </a:tr>
-              <a:tr h="370840">
-                <a:tc>
-                  <a:txBody>
-                    <a:bodyPr/>
-                    <a:lstStyle/>
-                    <a:p>
-                      <a:pPr algn="ctr"/>
-                      <a:r>
-                        <a:rPr lang="en-US" dirty="0" smtClean="0"/>
-                        <a:t>Occupancy</a:t>
-                      </a:r>
-                      <a:r>
-                        <a:rPr lang="en-US" baseline="0" dirty="0" smtClean="0"/>
-                        <a:t> forward tracker in %</a:t>
-                      </a:r>
-                      <a:endParaRPr lang="en-US" dirty="0"/>
-                    </a:p>
-                  </a:txBody>
-                  <a:tcPr anchor="ctr"/>
-                </a:tc>
-                <a:tc>
-                  <a:txBody>
-                    <a:bodyPr/>
-                    <a:lstStyle/>
-                    <a:p>
-                      <a:pPr algn="ctr"/>
-                      <a:r>
-                        <a:rPr lang="en-US" dirty="0" smtClean="0"/>
-                        <a:t>100</a:t>
-                      </a:r>
-                      <a:endParaRPr lang="en-US" dirty="0"/>
-                    </a:p>
-                  </a:txBody>
-                  <a:tcPr anchor="ctr"/>
-                </a:tc>
-                <a:tc>
-                  <a:txBody>
-                    <a:bodyPr/>
-                    <a:lstStyle/>
-                    <a:p>
-                      <a:pPr algn="ctr"/>
-                      <a:r>
-                        <a:rPr lang="en-US" dirty="0" smtClean="0"/>
-                        <a:t>30</a:t>
-                      </a:r>
-                      <a:endParaRPr lang="en-US" dirty="0"/>
-                    </a:p>
-                  </a:txBody>
-                  <a:tcPr anchor="ctr"/>
-                </a:tc>
-              </a:tr>
-              <a:tr h="370840">
-                <a:tc>
-                  <a:txBody>
-                    <a:bodyPr/>
-                    <a:lstStyle/>
-                    <a:p>
-                      <a:pPr marL="0" marR="0" indent="0" algn="ctr" defTabSz="914400" rtl="0" eaLnBrk="1" fontAlgn="auto" latinLnBrk="0" hangingPunct="1">
-                        <a:lnSpc>
-                          <a:spcPct val="100000"/>
-                        </a:lnSpc>
-                        <a:spcBef>
-                          <a:spcPts val="0"/>
-                        </a:spcBef>
-                        <a:spcAft>
-                          <a:spcPts val="0"/>
-                        </a:spcAft>
-                        <a:buClrTx/>
-                        <a:buSzTx/>
-                        <a:buFontTx/>
-                        <a:buNone/>
-                        <a:tabLst/>
-                        <a:defRPr/>
-                      </a:pPr>
-                      <a:r>
-                        <a:rPr lang="en-US" dirty="0" smtClean="0"/>
-                        <a:t>Occupancy</a:t>
-                      </a:r>
-                      <a:r>
-                        <a:rPr lang="en-US" baseline="0" dirty="0" smtClean="0"/>
-                        <a:t> back tracker</a:t>
-                      </a:r>
-                      <a:endParaRPr lang="en-US" dirty="0" smtClean="0"/>
-                    </a:p>
-                    <a:p>
-                      <a:pPr algn="ctr"/>
-                      <a:r>
-                        <a:rPr lang="en-US" dirty="0" smtClean="0"/>
-                        <a:t>In %</a:t>
-                      </a:r>
-                      <a:endParaRPr lang="en-US" dirty="0"/>
-                    </a:p>
-                  </a:txBody>
-                  <a:tcPr anchor="ctr"/>
-                </a:tc>
-                <a:tc>
-                  <a:txBody>
-                    <a:bodyPr/>
-                    <a:lstStyle/>
-                    <a:p>
-                      <a:pPr algn="ctr"/>
-                      <a:r>
-                        <a:rPr lang="en-US" dirty="0" smtClean="0"/>
-                        <a:t>37.3</a:t>
-                      </a:r>
-                      <a:endParaRPr lang="en-US" dirty="0"/>
-                    </a:p>
-                  </a:txBody>
-                  <a:tcPr anchor="ctr"/>
-                </a:tc>
-                <a:tc>
-                  <a:txBody>
-                    <a:bodyPr/>
-                    <a:lstStyle/>
-                    <a:p>
-                      <a:pPr algn="ctr"/>
-                      <a:r>
-                        <a:rPr lang="en-US" dirty="0" smtClean="0"/>
-                        <a:t>11.2</a:t>
-                      </a:r>
-                      <a:endParaRPr lang="en-US" dirty="0"/>
-                    </a:p>
-                  </a:txBody>
-                  <a:tcPr anchor="ctr"/>
-                </a:tc>
-              </a:tr>
-            </a:tbl>
-          </a:graphicData>
-        </a:graphic>
-      </p:graphicFrame>
-      <p:sp>
-        <p:nvSpPr>
-          <p:cNvPr id="18" name="TextBox 17"/>
-          <p:cNvSpPr txBox="1"/>
-          <p:nvPr/>
-        </p:nvSpPr>
-        <p:spPr>
-          <a:xfrm>
-            <a:off x="6784075" y="4876800"/>
-            <a:ext cx="1978925" cy="1754326"/>
-          </a:xfrm>
-          <a:prstGeom prst="rect">
-            <a:avLst/>
-          </a:prstGeom>
-          <a:noFill/>
-          <a:ln>
-            <a:solidFill>
-              <a:schemeClr val="tx1"/>
-            </a:solidFill>
-          </a:ln>
-        </p:spPr>
-        <p:txBody>
-          <a:bodyPr wrap="square" rtlCol="0">
-            <a:spAutoFit/>
-          </a:bodyPr>
-          <a:lstStyle/>
-          <a:p>
-            <a:pPr algn="ctr"/>
-            <a:r>
-              <a:rPr lang="en-US" dirty="0" smtClean="0"/>
-              <a:t>Need to test clustering and correlations </a:t>
-            </a:r>
-            <a:r>
-              <a:rPr lang="en-US" dirty="0" err="1" smtClean="0"/>
-              <a:t>betweens</a:t>
-            </a:r>
-            <a:r>
-              <a:rPr lang="en-US" dirty="0" smtClean="0"/>
-              <a:t> planes for further reduction</a:t>
-            </a:r>
-            <a:endParaRPr lang="en-US" dirty="0" smtClean="0"/>
-          </a:p>
-        </p:txBody>
-      </p:sp>
-    </p:spTree>
-    <p:extLst>
-      <p:ext uri="{BB962C8B-B14F-4D97-AF65-F5344CB8AC3E}">
-        <p14:creationId xmlns:p14="http://schemas.microsoft.com/office/powerpoint/2010/main" val="2578674691"/>
-      </p:ext>
-    </p:extLst>
-  </p:cSld>
-  <p:clrMapOvr>
-    <a:masterClrMapping/>
-  </p:clrMapOvr>
-</p:sld>
-</file>
-
-<file path=ppt/slides/slide4.xml><?xml version="1.0" encoding="utf-8"?>
-<p:sld xmlns:a="http://schemas.openxmlformats.org/drawingml/2006/main" xmlns:r="http://schemas.openxmlformats.org/officeDocument/2006/relationships" xmlns:p="http://schemas.openxmlformats.org/presentationml/2006/main">
-  <p:cSld>
-    <p:spTree>
-      <p:nvGrpSpPr>
-        <p:cNvPr id="1" name=""/>
-        <p:cNvGrpSpPr/>
-        <p:nvPr/>
-      </p:nvGrpSpPr>
-      <p:grpSpPr>
-        <a:xfrm>
-          <a:off x="0" y="0"/>
-          <a:ext cx="0" cy="0"/>
-          <a:chOff x="0" y="0"/>
-          <a:chExt cx="0" cy="0"/>
-        </a:xfrm>
-      </p:grpSpPr>
-      <p:sp>
-        <p:nvSpPr>
-          <p:cNvPr id="2" name="Title 1"/>
-          <p:cNvSpPr>
-            <a:spLocks noGrp="1"/>
-          </p:cNvSpPr>
-          <p:nvPr>
-            <p:ph type="title"/>
-          </p:nvPr>
-        </p:nvSpPr>
-        <p:spPr/>
-        <p:txBody>
           <a:bodyPr>
             <a:normAutofit fontScale="90000"/>
           </a:bodyPr>
@@ -10369,7 +9037,19 @@
           <a:p>
             <a:r>
               <a:rPr lang="en-US" dirty="0" smtClean="0"/>
-              <a:t>GEp5 event size ( after deconvolution)</a:t>
+              <a:t>GEp5 event size ( after </a:t>
+            </a:r>
+            <a:r>
+              <a:rPr lang="en-US" dirty="0" smtClean="0"/>
+              <a:t>deconvolution and </a:t>
+            </a:r>
+            <a:r>
+              <a:rPr lang="en-US" dirty="0" err="1" smtClean="0"/>
+              <a:t>geomtrical</a:t>
+            </a:r>
+            <a:r>
+              <a:rPr lang="en-US" dirty="0" smtClean="0"/>
+              <a:t> matching)</a:t>
             </a:r>
             <a:endParaRPr lang="en-US" dirty="0"/>
           </a:p>
@@ -10385,7 +9065,7 @@
             <p:ph idx="1"/>
             <p:extLst>
               <p:ext uri="{D42A27DB-BD31-4B8C-83A1-F6EECF244321}">
-                <p14:modId xmlns:p14="http://schemas.microsoft.com/office/powerpoint/2010/main" val="3214520628"/>
+                <p14:modId xmlns:p14="http://schemas.microsoft.com/office/powerpoint/2010/main" val="1221165736"/>
               </p:ext>
             </p:extLst>
           </p:nvPr>
@@ -10613,52 +9293,52 @@
                       <a:pPr algn="ctr"/>
                       <a:r>
                         <a:rPr lang="en-US" dirty="0" smtClean="0"/>
-                        <a:t>30.2</a:t>
-                      </a:r>
-                      <a:endParaRPr lang="en-US" dirty="0"/>
-                    </a:p>
-                  </a:txBody>
-                  <a:tcPr anchor="ctr"/>
-                </a:tc>
-                <a:tc>
-                  <a:txBody>
-                    <a:bodyPr/>
-                    <a:lstStyle/>
-                    <a:p>
-                      <a:pPr algn="ctr"/>
-                      <a:r>
-                        <a:rPr lang="en-US" dirty="0" smtClean="0"/>
-                        <a:t>6600</a:t>
-                      </a:r>
-                      <a:endParaRPr lang="en-US" dirty="0"/>
-                    </a:p>
-                  </a:txBody>
-                  <a:tcPr anchor="ctr"/>
-                </a:tc>
-                <a:tc>
-                  <a:txBody>
-                    <a:bodyPr/>
-                    <a:lstStyle/>
-                    <a:p>
-                      <a:pPr algn="ctr"/>
-                      <a:r>
-                        <a:rPr lang="en-US" dirty="0" smtClean="0"/>
-                        <a:t>79,200</a:t>
-                      </a:r>
-                      <a:endParaRPr lang="en-US" dirty="0"/>
-                    </a:p>
-                  </a:txBody>
-                  <a:tcPr anchor="ctr"/>
-                </a:tc>
-                <a:tc>
-                  <a:txBody>
-                    <a:bodyPr/>
-                    <a:lstStyle/>
-                    <a:p>
-                      <a:pPr algn="ctr"/>
-                      <a:r>
-                        <a:rPr lang="en-US" dirty="0" smtClean="0"/>
-                        <a:t>210</a:t>
+                        <a:t>18.1</a:t>
+                      </a:r>
+                      <a:endParaRPr lang="en-US" dirty="0"/>
+                    </a:p>
+                  </a:txBody>
+                  <a:tcPr anchor="ctr"/>
+                </a:tc>
+                <a:tc>
+                  <a:txBody>
+                    <a:bodyPr/>
+                    <a:lstStyle/>
+                    <a:p>
+                      <a:pPr algn="ctr"/>
+                      <a:r>
+                        <a:rPr lang="en-US" dirty="0" smtClean="0"/>
+                        <a:t>7430</a:t>
+                      </a:r>
+                      <a:endParaRPr lang="en-US" dirty="0"/>
+                    </a:p>
+                  </a:txBody>
+                  <a:tcPr anchor="ctr"/>
+                </a:tc>
+                <a:tc>
+                  <a:txBody>
+                    <a:bodyPr/>
+                    <a:lstStyle/>
+                    <a:p>
+                      <a:pPr algn="ctr"/>
+                      <a:r>
+                        <a:rPr lang="en-US" dirty="0" smtClean="0"/>
+                        <a:t>136,000</a:t>
+                      </a:r>
+                      <a:endParaRPr lang="en-US" dirty="0"/>
+                    </a:p>
+                  </a:txBody>
+                  <a:tcPr anchor="ctr"/>
+                </a:tc>
+                <a:tc>
+                  <a:txBody>
+                    <a:bodyPr/>
+                    <a:lstStyle/>
+                    <a:p>
+                      <a:pPr algn="ctr"/>
+                      <a:r>
+                        <a:rPr lang="en-US" dirty="0" smtClean="0"/>
+                        <a:t>90</a:t>
                       </a:r>
                       <a:endParaRPr lang="en-US" dirty="0"/>
                     </a:p>
@@ -10720,52 +9400,51 @@
                       <a:pPr algn="ctr"/>
                       <a:r>
                         <a:rPr lang="en-US" dirty="0" smtClean="0"/>
-                        <a:t>11.2</a:t>
-                      </a:r>
-                      <a:endParaRPr lang="en-US" dirty="0"/>
-                    </a:p>
-                  </a:txBody>
-                  <a:tcPr anchor="ctr"/>
-                </a:tc>
-                <a:tc>
-                  <a:txBody>
-                    <a:bodyPr/>
-                    <a:lstStyle/>
-                    <a:p>
-                      <a:pPr algn="ctr"/>
-                      <a:r>
-                        <a:rPr lang="en-US" dirty="0" smtClean="0"/>
-                        <a:t>6720</a:t>
-                      </a:r>
-                      <a:endParaRPr lang="en-US" dirty="0"/>
-                    </a:p>
-                  </a:txBody>
-                  <a:tcPr anchor="ctr"/>
-                </a:tc>
-                <a:tc>
-                  <a:txBody>
-                    <a:bodyPr/>
-                    <a:lstStyle/>
-                    <a:p>
-                      <a:pPr algn="ctr"/>
-                      <a:r>
-                        <a:rPr lang="en-US" dirty="0" smtClean="0"/>
-                        <a:t>80,600</a:t>
-                      </a:r>
-                      <a:endParaRPr lang="en-US" dirty="0"/>
-                    </a:p>
-                  </a:txBody>
-                  <a:tcPr anchor="ctr"/>
-                </a:tc>
-                <a:tc>
-                  <a:txBody>
-                    <a:bodyPr/>
-                    <a:lstStyle/>
-                    <a:p>
-                      <a:pPr algn="ctr"/>
-                      <a:r>
-                        <a:rPr lang="en-US" dirty="0" smtClean="0"/>
-                        <a:t>70</a:t>
+                        <a:t>22.4</a:t>
+                      </a:r>
+                      <a:endParaRPr lang="en-US" dirty="0"/>
+                    </a:p>
+                  </a:txBody>
+                  <a:tcPr anchor="ctr"/>
+                </a:tc>
+                <a:tc>
+                  <a:txBody>
+                    <a:bodyPr/>
+                    <a:lstStyle/>
+                    <a:p>
+                      <a:pPr algn="ctr"/>
+                      <a:r>
+                        <a:rPr lang="en-US" dirty="0" smtClean="0"/>
+                        <a:t>12600</a:t>
+                      </a:r>
+                    </a:p>
+                  </a:txBody>
+                  <a:tcPr anchor="ctr"/>
+                </a:tc>
+                <a:tc>
+                  <a:txBody>
+                    <a:bodyPr/>
+                    <a:lstStyle/>
+                    <a:p>
+                      <a:pPr algn="ctr"/>
+                      <a:r>
+                        <a:rPr lang="en-US" dirty="0" smtClean="0"/>
+                        <a:t>230,000</a:t>
+                      </a:r>
+                      <a:endParaRPr lang="en-US" dirty="0"/>
+                    </a:p>
+                  </a:txBody>
+                  <a:tcPr anchor="ctr"/>
+                </a:tc>
+                <a:tc>
+                  <a:txBody>
+                    <a:bodyPr/>
+                    <a:lstStyle/>
+                    <a:p>
+                      <a:pPr algn="ctr"/>
+                      <a:r>
+                        <a:rPr lang="en-US" dirty="0" smtClean="0"/>
+                        <a:t>150</a:t>
                       </a:r>
                       <a:endParaRPr lang="en-US" dirty="0"/>
                     </a:p>
@@ -11173,7 +9852,7 @@
                       <a:pPr algn="ctr"/>
                       <a:r>
                         <a:rPr lang="en-US" dirty="0" smtClean="0"/>
-                        <a:t>371 </a:t>
+                        <a:t>325.3 </a:t>
                       </a:r>
                       <a:r>
                         <a:rPr lang="en-US" dirty="0" smtClean="0"/>
@@ -11268,7 +9947,7 @@
 </p:sld>
 </file>
 
-<file path=ppt/slides/slide5.xml><?xml version="1.0" encoding="utf-8"?>
+<file path=ppt/slides/slide4.xml><?xml version="1.0" encoding="utf-8"?>
 <p:sld xmlns:a="http://schemas.openxmlformats.org/drawingml/2006/main" xmlns:r="http://schemas.openxmlformats.org/officeDocument/2006/relationships" xmlns:p="http://schemas.openxmlformats.org/presentationml/2006/main">
   <p:cSld>
     <p:spTree>
@@ -11605,7 +10284,15 @@
             <a:pPr algn="ctr"/>
             <a:r>
               <a:rPr lang="en-US" dirty="0" smtClean="0"/>
-              <a:t>4000 MB/s out</a:t>
+              <a:t>1430</a:t>
+            </a:r>
+            <a:r>
+              <a:rPr lang="en-US" dirty="0" smtClean="0"/>
+              <a:t> </a:t>
+            </a:r>
+            <a:r>
+              <a:rPr lang="en-US" dirty="0" smtClean="0"/>
+              <a:t>MB/s out</a:t>
             </a:r>
           </a:p>
           <a:p>
@@ -11665,7 +10352,15 @@
             <a:pPr algn="ctr"/>
             <a:r>
               <a:rPr lang="en-US" dirty="0" smtClean="0"/>
-              <a:t>4000 MB/s in</a:t>
+              <a:t>1430</a:t>
+            </a:r>
+            <a:r>
+              <a:rPr lang="en-US" dirty="0" smtClean="0"/>
+              <a:t> </a:t>
+            </a:r>
+            <a:r>
+              <a:rPr lang="en-US" dirty="0" smtClean="0"/>
+              <a:t>MB/s in</a:t>
             </a:r>
           </a:p>
           <a:p>
@@ -11679,7 +10374,11 @@
             <a:pPr algn="ctr"/>
             <a:r>
               <a:rPr lang="en-US" dirty="0" smtClean="0"/>
-              <a:t>1400 </a:t>
+              <a:t>715</a:t>
+            </a:r>
+            <a:r>
+              <a:rPr lang="en-US" dirty="0" smtClean="0"/>
+              <a:t> </a:t>
             </a:r>
             <a:r>
               <a:rPr lang="en-US" dirty="0" smtClean="0"/>
@@ -11691,14 +10390,14 @@
             <a:pPr algn="ctr"/>
             <a:r>
               <a:rPr lang="en-US" dirty="0" smtClean="0"/>
-              <a:t>Zero suppress</a:t>
+              <a:t>Keep A and T</a:t>
             </a:r>
           </a:p>
           <a:p>
             <a:pPr algn="ctr"/>
             <a:r>
               <a:rPr lang="en-US" b="1" dirty="0" smtClean="0"/>
-              <a:t>280 MB/s</a:t>
+              <a:t>240 MB/s</a:t>
             </a:r>
             <a:endParaRPr lang="en-US" b="1" dirty="0" smtClean="0"/>
           </a:p>
@@ -11920,7 +10619,7 @@
             <a:pPr algn="ctr"/>
             <a:r>
               <a:rPr lang="en-US" dirty="0" smtClean="0"/>
-              <a:t>371</a:t>
+              <a:t>325.3</a:t>
             </a:r>
             <a:r>
               <a:rPr lang="en-US" dirty="0" smtClean="0"/>
@@ -12375,7 +11074,11 @@
             <a:pPr algn="ctr"/>
             <a:r>
               <a:rPr lang="en-US" b="1" dirty="0" smtClean="0"/>
-              <a:t>41.76 MB/s </a:t>
+              <a:t>45 </a:t>
+            </a:r>
+            <a:r>
+              <a:rPr lang="en-US" b="1" dirty="0" smtClean="0"/>
+              <a:t>MB/s </a:t>
             </a:r>
             <a:r>
               <a:rPr lang="en-US" dirty="0" smtClean="0"/>
@@ -13173,7 +11876,7 @@
 </p:sld>
 </file>
 
-<file path=ppt/slides/slide6.xml><?xml version="1.0" encoding="utf-8"?>
+<file path=ppt/slides/slide5.xml><?xml version="1.0" encoding="utf-8"?>
 <p:sld xmlns:a="http://schemas.openxmlformats.org/drawingml/2006/main" xmlns:r="http://schemas.openxmlformats.org/officeDocument/2006/relationships" xmlns:p="http://schemas.openxmlformats.org/presentationml/2006/main">
   <p:cSld>
     <p:spTree>
@@ -13346,7 +12049,7 @@
 </p:sld>
 </file>
 
-<file path=ppt/slides/slide7.xml><?xml version="1.0" encoding="utf-8"?>
+<file path=ppt/slides/slide6.xml><?xml version="1.0" encoding="utf-8"?>
 <p:sld xmlns:a="http://schemas.openxmlformats.org/drawingml/2006/main" xmlns:r="http://schemas.openxmlformats.org/officeDocument/2006/relationships" xmlns:p="http://schemas.openxmlformats.org/presentationml/2006/main">
   <p:cSld>
     <p:spTree>
@@ -13728,6 +12431,699 @@
 </p:sld>
 </file>
 
+<file path=ppt/slides/slide7.xml><?xml version="1.0" encoding="utf-8"?>
+<p:sld xmlns:a="http://schemas.openxmlformats.org/drawingml/2006/main" xmlns:r="http://schemas.openxmlformats.org/officeDocument/2006/relationships" xmlns:p="http://schemas.openxmlformats.org/presentationml/2006/main">
+  <p:cSld>
+    <p:spTree>
+      <p:nvGrpSpPr>
+        <p:cNvPr id="1" name=""/>
+        <p:cNvGrpSpPr/>
+        <p:nvPr/>
+      </p:nvGrpSpPr>
+      <p:grpSpPr>
+        <a:xfrm>
+          <a:off x="0" y="0"/>
+          <a:ext cx="0" cy="0"/>
+          <a:chOff x="0" y="0"/>
+          <a:chExt cx="0" cy="0"/>
+        </a:xfrm>
+      </p:grpSpPr>
+      <p:sp>
+        <p:nvSpPr>
+          <p:cNvPr id="2" name="Title 1"/>
+          <p:cNvSpPr>
+            <a:spLocks noGrp="1"/>
+          </p:cNvSpPr>
+          <p:nvPr>
+            <p:ph type="title"/>
+          </p:nvPr>
+        </p:nvSpPr>
+        <p:spPr/>
+        <p:txBody>
+          <a:bodyPr/>
+          <a:lstStyle/>
+          <a:p>
+            <a:r>
+              <a:rPr lang="en-US" dirty="0" smtClean="0"/>
+              <a:t>GEM data flow </a:t>
+            </a:r>
+            <a:r>
+              <a:rPr lang="en-US" dirty="0" err="1" smtClean="0"/>
+              <a:t>GEp</a:t>
+            </a:r>
+            <a:endParaRPr lang="en-US" dirty="0"/>
+          </a:p>
+        </p:txBody>
+      </p:sp>
+      <p:sp>
+        <p:nvSpPr>
+          <p:cNvPr id="4" name="TextBox 3"/>
+          <p:cNvSpPr txBox="1"/>
+          <p:nvPr/>
+        </p:nvSpPr>
+        <p:spPr>
+          <a:xfrm>
+            <a:off x="221776" y="2776182"/>
+            <a:ext cx="1143000" cy="923330"/>
+          </a:xfrm>
+          <a:prstGeom prst="rect">
+            <a:avLst/>
+          </a:prstGeom>
+          <a:noFill/>
+          <a:ln>
+            <a:solidFill>
+              <a:schemeClr val="tx1"/>
+            </a:solidFill>
+          </a:ln>
+        </p:spPr>
+        <p:txBody>
+          <a:bodyPr wrap="square" rtlCol="0">
+            <a:spAutoFit/>
+          </a:bodyPr>
+          <a:lstStyle/>
+          <a:p>
+            <a:pPr algn="ctr"/>
+            <a:r>
+              <a:rPr lang="en-US" dirty="0" smtClean="0"/>
+              <a:t>GEM</a:t>
+            </a:r>
+          </a:p>
+          <a:p>
+            <a:pPr algn="ctr"/>
+            <a:r>
+              <a:rPr lang="en-US" dirty="0" smtClean="0"/>
+              <a:t>112 640</a:t>
+            </a:r>
+          </a:p>
+          <a:p>
+            <a:pPr algn="ctr"/>
+            <a:r>
+              <a:rPr lang="en-US" dirty="0" smtClean="0"/>
+              <a:t>strips</a:t>
+            </a:r>
+            <a:r>
+              <a:rPr lang="en-US" dirty="0" smtClean="0"/>
+              <a:t> </a:t>
+            </a:r>
+            <a:endParaRPr lang="en-US" dirty="0" smtClean="0"/>
+          </a:p>
+        </p:txBody>
+      </p:sp>
+      <p:sp>
+        <p:nvSpPr>
+          <p:cNvPr id="5" name="Right Arrow 4"/>
+          <p:cNvSpPr/>
+          <p:nvPr/>
+        </p:nvSpPr>
+        <p:spPr>
+          <a:xfrm>
+            <a:off x="1447800" y="3047347"/>
+            <a:ext cx="914400" cy="381000"/>
+          </a:xfrm>
+          <a:prstGeom prst="rightArrow">
+            <a:avLst/>
+          </a:prstGeom>
+        </p:spPr>
+        <p:style>
+          <a:lnRef idx="2">
+            <a:schemeClr val="accent1">
+              <a:shade val="50000"/>
+            </a:schemeClr>
+          </a:lnRef>
+          <a:fillRef idx="1">
+            <a:schemeClr val="accent1"/>
+          </a:fillRef>
+          <a:effectRef idx="0">
+            <a:schemeClr val="accent1"/>
+          </a:effectRef>
+          <a:fontRef idx="minor">
+            <a:schemeClr val="lt1"/>
+          </a:fontRef>
+        </p:style>
+        <p:txBody>
+          <a:bodyPr rtlCol="0" anchor="ctr"/>
+          <a:lstStyle/>
+          <a:p>
+            <a:pPr algn="ctr"/>
+            <a:endParaRPr lang="en-US"/>
+          </a:p>
+        </p:txBody>
+      </p:sp>
+      <p:sp>
+        <p:nvSpPr>
+          <p:cNvPr id="7" name="TextBox 6"/>
+          <p:cNvSpPr txBox="1"/>
+          <p:nvPr/>
+        </p:nvSpPr>
+        <p:spPr>
+          <a:xfrm>
+            <a:off x="2362200" y="2165361"/>
+            <a:ext cx="1143000" cy="2031325"/>
+          </a:xfrm>
+          <a:prstGeom prst="rect">
+            <a:avLst/>
+          </a:prstGeom>
+          <a:noFill/>
+          <a:ln>
+            <a:solidFill>
+              <a:schemeClr val="tx1"/>
+            </a:solidFill>
+          </a:ln>
+        </p:spPr>
+        <p:txBody>
+          <a:bodyPr wrap="square" rtlCol="0">
+            <a:spAutoFit/>
+          </a:bodyPr>
+          <a:lstStyle/>
+          <a:p>
+            <a:pPr algn="ctr"/>
+            <a:r>
+              <a:rPr lang="en-US" dirty="0" smtClean="0"/>
+              <a:t>55 MPDs</a:t>
+            </a:r>
+          </a:p>
+          <a:p>
+            <a:pPr algn="ctr"/>
+            <a:r>
+              <a:rPr lang="en-US" dirty="0" smtClean="0"/>
+              <a:t>112 640</a:t>
+            </a:r>
+          </a:p>
+          <a:p>
+            <a:pPr algn="ctr"/>
+            <a:r>
+              <a:rPr lang="en-US" dirty="0" smtClean="0"/>
+              <a:t>X 6 samples x 3 bytes</a:t>
+            </a:r>
+          </a:p>
+          <a:p>
+            <a:pPr algn="ctr"/>
+            <a:r>
+              <a:rPr lang="en-US" dirty="0" smtClean="0"/>
+              <a:t>= 10.3 GB/s</a:t>
+            </a:r>
+          </a:p>
+        </p:txBody>
+      </p:sp>
+      <p:sp>
+        <p:nvSpPr>
+          <p:cNvPr id="8" name="TextBox 7"/>
+          <p:cNvSpPr txBox="1"/>
+          <p:nvPr/>
+        </p:nvSpPr>
+        <p:spPr>
+          <a:xfrm>
+            <a:off x="3653297" y="1355256"/>
+            <a:ext cx="1813766" cy="369332"/>
+          </a:xfrm>
+          <a:prstGeom prst="rect">
+            <a:avLst/>
+          </a:prstGeom>
+          <a:noFill/>
+          <a:ln>
+            <a:solidFill>
+              <a:schemeClr val="tx1"/>
+            </a:solidFill>
+          </a:ln>
+        </p:spPr>
+        <p:txBody>
+          <a:bodyPr wrap="none" rtlCol="0">
+            <a:spAutoFit/>
+          </a:bodyPr>
+          <a:lstStyle/>
+          <a:p>
+            <a:pPr algn="ctr"/>
+            <a:r>
+              <a:rPr lang="en-US" dirty="0" smtClean="0"/>
+              <a:t>5 KHz trigger rate</a:t>
+            </a:r>
+            <a:endParaRPr lang="en-US" dirty="0" smtClean="0"/>
+          </a:p>
+        </p:txBody>
+      </p:sp>
+      <p:sp>
+        <p:nvSpPr>
+          <p:cNvPr id="10" name="TextBox 9"/>
+          <p:cNvSpPr txBox="1"/>
+          <p:nvPr/>
+        </p:nvSpPr>
+        <p:spPr>
+          <a:xfrm>
+            <a:off x="3968087" y="2738082"/>
+            <a:ext cx="1600200" cy="923330"/>
+          </a:xfrm>
+          <a:prstGeom prst="rect">
+            <a:avLst/>
+          </a:prstGeom>
+          <a:noFill/>
+          <a:ln>
+            <a:solidFill>
+              <a:schemeClr val="tx1"/>
+            </a:solidFill>
+          </a:ln>
+        </p:spPr>
+        <p:txBody>
+          <a:bodyPr wrap="square" rtlCol="0">
+            <a:spAutoFit/>
+          </a:bodyPr>
+          <a:lstStyle/>
+          <a:p>
+            <a:pPr algn="ctr"/>
+            <a:r>
+              <a:rPr lang="en-US" dirty="0" smtClean="0"/>
+              <a:t>MPD</a:t>
+            </a:r>
+          </a:p>
+          <a:p>
+            <a:pPr algn="ctr"/>
+            <a:r>
+              <a:rPr lang="en-US" dirty="0" smtClean="0"/>
+              <a:t>Zero suppress</a:t>
+            </a:r>
+          </a:p>
+          <a:p>
+            <a:pPr algn="ctr"/>
+            <a:r>
+              <a:rPr lang="en-US" dirty="0" smtClean="0"/>
+              <a:t>= </a:t>
+            </a:r>
+            <a:r>
+              <a:rPr lang="en-US" dirty="0" smtClean="0"/>
+              <a:t>1</a:t>
+            </a:r>
+            <a:r>
+              <a:rPr lang="en-US" dirty="0" smtClean="0"/>
+              <a:t>.8 GB/s</a:t>
+            </a:r>
+          </a:p>
+        </p:txBody>
+      </p:sp>
+      <p:sp>
+        <p:nvSpPr>
+          <p:cNvPr id="11" name="Right Arrow 10"/>
+          <p:cNvSpPr/>
+          <p:nvPr/>
+        </p:nvSpPr>
+        <p:spPr>
+          <a:xfrm>
+            <a:off x="3507475" y="3047347"/>
+            <a:ext cx="457200" cy="381000"/>
+          </a:xfrm>
+          <a:prstGeom prst="rightArrow">
+            <a:avLst/>
+          </a:prstGeom>
+        </p:spPr>
+        <p:style>
+          <a:lnRef idx="2">
+            <a:schemeClr val="accent1">
+              <a:shade val="50000"/>
+            </a:schemeClr>
+          </a:lnRef>
+          <a:fillRef idx="1">
+            <a:schemeClr val="accent1"/>
+          </a:fillRef>
+          <a:effectRef idx="0">
+            <a:schemeClr val="accent1"/>
+          </a:effectRef>
+          <a:fontRef idx="minor">
+            <a:schemeClr val="lt1"/>
+          </a:fontRef>
+        </p:style>
+        <p:txBody>
+          <a:bodyPr rtlCol="0" anchor="ctr"/>
+          <a:lstStyle/>
+          <a:p>
+            <a:pPr algn="ctr"/>
+            <a:endParaRPr lang="en-US"/>
+          </a:p>
+        </p:txBody>
+      </p:sp>
+      <p:sp>
+        <p:nvSpPr>
+          <p:cNvPr id="12" name="TextBox 11"/>
+          <p:cNvSpPr txBox="1"/>
+          <p:nvPr/>
+        </p:nvSpPr>
+        <p:spPr>
+          <a:xfrm>
+            <a:off x="1447800" y="2406850"/>
+            <a:ext cx="833883" cy="369332"/>
+          </a:xfrm>
+          <a:prstGeom prst="rect">
+            <a:avLst/>
+          </a:prstGeom>
+          <a:noFill/>
+          <a:ln>
+            <a:solidFill>
+              <a:schemeClr val="tx1"/>
+            </a:solidFill>
+          </a:ln>
+        </p:spPr>
+        <p:txBody>
+          <a:bodyPr wrap="none" rtlCol="0">
+            <a:spAutoFit/>
+          </a:bodyPr>
+          <a:lstStyle/>
+          <a:p>
+            <a:pPr algn="ctr"/>
+            <a:r>
+              <a:rPr lang="en-US" dirty="0" smtClean="0"/>
+              <a:t>Analog</a:t>
+            </a:r>
+            <a:endParaRPr lang="en-US" dirty="0" smtClean="0"/>
+          </a:p>
+        </p:txBody>
+      </p:sp>
+      <p:sp>
+        <p:nvSpPr>
+          <p:cNvPr id="14" name="TextBox 13"/>
+          <p:cNvSpPr txBox="1"/>
+          <p:nvPr/>
+        </p:nvSpPr>
+        <p:spPr>
+          <a:xfrm>
+            <a:off x="5943600" y="2165359"/>
+            <a:ext cx="1600200" cy="2031325"/>
+          </a:xfrm>
+          <a:prstGeom prst="rect">
+            <a:avLst/>
+          </a:prstGeom>
+          <a:noFill/>
+          <a:ln>
+            <a:solidFill>
+              <a:schemeClr val="tx1"/>
+            </a:solidFill>
+          </a:ln>
+        </p:spPr>
+        <p:txBody>
+          <a:bodyPr wrap="square" rtlCol="0">
+            <a:spAutoFit/>
+          </a:bodyPr>
+          <a:lstStyle/>
+          <a:p>
+            <a:pPr algn="ctr"/>
+            <a:r>
+              <a:rPr lang="en-US" dirty="0" smtClean="0"/>
+              <a:t>SSP</a:t>
+            </a:r>
+          </a:p>
+          <a:p>
+            <a:pPr algn="ctr"/>
+            <a:r>
+              <a:rPr lang="en-US" dirty="0" smtClean="0"/>
+              <a:t> Deconvolution</a:t>
+            </a:r>
+          </a:p>
+          <a:p>
+            <a:pPr algn="ctr"/>
+            <a:r>
+              <a:rPr lang="en-US" dirty="0" smtClean="0"/>
+              <a:t>( factor 2)</a:t>
+            </a:r>
+          </a:p>
+          <a:p>
+            <a:pPr algn="ctr"/>
+            <a:r>
+              <a:rPr lang="en-US" dirty="0" smtClean="0"/>
+              <a:t>= 0.9 GB/s</a:t>
+            </a:r>
+          </a:p>
+          <a:p>
+            <a:pPr algn="ctr"/>
+            <a:r>
+              <a:rPr lang="en-US" dirty="0" smtClean="0"/>
+              <a:t>Keep A &amp; T</a:t>
+            </a:r>
+          </a:p>
+          <a:p>
+            <a:pPr algn="ctr"/>
+            <a:r>
+              <a:rPr lang="en-US" dirty="0" smtClean="0"/>
+              <a:t>(factor 3)</a:t>
+            </a:r>
+            <a:endParaRPr lang="en-US" dirty="0" smtClean="0"/>
+          </a:p>
+          <a:p>
+            <a:pPr algn="ctr"/>
+            <a:r>
+              <a:rPr lang="en-US" dirty="0" smtClean="0"/>
+              <a:t>=0.3 GB/s</a:t>
+            </a:r>
+            <a:r>
+              <a:rPr lang="en-US" dirty="0" smtClean="0"/>
+              <a:t> </a:t>
+            </a:r>
+          </a:p>
+        </p:txBody>
+      </p:sp>
+      <p:sp>
+        <p:nvSpPr>
+          <p:cNvPr id="15" name="Right Arrow 14"/>
+          <p:cNvSpPr/>
+          <p:nvPr/>
+        </p:nvSpPr>
+        <p:spPr>
+          <a:xfrm>
+            <a:off x="5564875" y="3009247"/>
+            <a:ext cx="457200" cy="381000"/>
+          </a:xfrm>
+          <a:prstGeom prst="rightArrow">
+            <a:avLst/>
+          </a:prstGeom>
+        </p:spPr>
+        <p:style>
+          <a:lnRef idx="2">
+            <a:schemeClr val="accent1">
+              <a:shade val="50000"/>
+            </a:schemeClr>
+          </a:lnRef>
+          <a:fillRef idx="1">
+            <a:schemeClr val="accent1"/>
+          </a:fillRef>
+          <a:effectRef idx="0">
+            <a:schemeClr val="accent1"/>
+          </a:effectRef>
+          <a:fontRef idx="minor">
+            <a:schemeClr val="lt1"/>
+          </a:fontRef>
+        </p:style>
+        <p:txBody>
+          <a:bodyPr rtlCol="0" anchor="ctr"/>
+          <a:lstStyle/>
+          <a:p>
+            <a:pPr algn="ctr"/>
+            <a:endParaRPr lang="en-US"/>
+          </a:p>
+        </p:txBody>
+      </p:sp>
+      <p:graphicFrame>
+        <p:nvGraphicFramePr>
+          <p:cNvPr id="17" name="Table 16"/>
+          <p:cNvGraphicFramePr>
+            <a:graphicFrameLocks noGrp="1"/>
+          </p:cNvGraphicFramePr>
+          <p:nvPr>
+            <p:extLst>
+              <p:ext uri="{D42A27DB-BD31-4B8C-83A1-F6EECF244321}">
+                <p14:modId xmlns:p14="http://schemas.microsoft.com/office/powerpoint/2010/main" val="1754958731"/>
+              </p:ext>
+            </p:extLst>
+          </p:nvPr>
+        </p:nvGraphicFramePr>
+        <p:xfrm>
+          <a:off x="1327245" y="4495800"/>
+          <a:ext cx="6288659" cy="1010920"/>
+        </p:xfrm>
+        <a:graphic>
+          <a:graphicData uri="http://schemas.openxmlformats.org/drawingml/2006/table">
+            <a:tbl>
+              <a:tblPr firstRow="1" bandRow="1">
+                <a:tableStyleId>{5C22544A-7EE6-4342-B048-85BDC9FD1C3A}</a:tableStyleId>
+              </a:tblPr>
+              <a:tblGrid>
+                <a:gridCol w="2587456"/>
+                <a:gridCol w="1790905"/>
+                <a:gridCol w="1910298"/>
+              </a:tblGrid>
+              <a:tr h="370840">
+                <a:tc>
+                  <a:txBody>
+                    <a:bodyPr/>
+                    <a:lstStyle/>
+                    <a:p>
+                      <a:pPr algn="ctr"/>
+                      <a:r>
+                        <a:rPr lang="en-US" dirty="0" smtClean="0"/>
+                        <a:t>Time window</a:t>
+                      </a:r>
+                      <a:endParaRPr lang="en-US" dirty="0"/>
+                    </a:p>
+                  </a:txBody>
+                  <a:tcPr/>
+                </a:tc>
+                <a:tc>
+                  <a:txBody>
+                    <a:bodyPr/>
+                    <a:lstStyle/>
+                    <a:p>
+                      <a:pPr algn="ctr"/>
+                      <a:r>
+                        <a:rPr lang="en-US" dirty="0" smtClean="0"/>
+                        <a:t>6x25</a:t>
+                      </a:r>
+                      <a:r>
+                        <a:rPr lang="en-US" baseline="0" dirty="0" smtClean="0"/>
+                        <a:t> ns</a:t>
+                      </a:r>
+                      <a:endParaRPr lang="en-US" dirty="0"/>
+                    </a:p>
+                  </a:txBody>
+                  <a:tcPr/>
+                </a:tc>
+                <a:tc>
+                  <a:txBody>
+                    <a:bodyPr/>
+                    <a:lstStyle/>
+                    <a:p>
+                      <a:pPr algn="ctr"/>
+                      <a:r>
+                        <a:rPr lang="en-US" dirty="0" smtClean="0"/>
+                        <a:t>3x25 ns</a:t>
+                      </a:r>
+                      <a:endParaRPr lang="en-US" dirty="0"/>
+                    </a:p>
+                  </a:txBody>
+                  <a:tcPr/>
+                </a:tc>
+              </a:tr>
+              <a:tr h="370840">
+                <a:tc>
+                  <a:txBody>
+                    <a:bodyPr/>
+                    <a:lstStyle/>
+                    <a:p>
+                      <a:pPr marL="0" marR="0" indent="0" algn="ctr" defTabSz="914400" rtl="0" eaLnBrk="1" fontAlgn="auto" latinLnBrk="0" hangingPunct="1">
+                        <a:lnSpc>
+                          <a:spcPct val="100000"/>
+                        </a:lnSpc>
+                        <a:spcBef>
+                          <a:spcPts val="0"/>
+                        </a:spcBef>
+                        <a:spcAft>
+                          <a:spcPts val="0"/>
+                        </a:spcAft>
+                        <a:buClrTx/>
+                        <a:buSzTx/>
+                        <a:buFontTx/>
+                        <a:buNone/>
+                        <a:tabLst/>
+                        <a:defRPr/>
+                      </a:pPr>
+                      <a:r>
+                        <a:rPr lang="en-US" dirty="0" smtClean="0"/>
+                        <a:t>Occupancy</a:t>
+                      </a:r>
+                      <a:r>
+                        <a:rPr lang="en-US" baseline="0" dirty="0" smtClean="0"/>
+                        <a:t> back tracker</a:t>
+                      </a:r>
+                      <a:endParaRPr lang="en-US" dirty="0" smtClean="0"/>
+                    </a:p>
+                    <a:p>
+                      <a:pPr algn="ctr"/>
+                      <a:r>
+                        <a:rPr lang="en-US" dirty="0" smtClean="0"/>
+                        <a:t>In %</a:t>
+                      </a:r>
+                      <a:endParaRPr lang="en-US" dirty="0"/>
+                    </a:p>
+                  </a:txBody>
+                  <a:tcPr anchor="ctr"/>
+                </a:tc>
+                <a:tc>
+                  <a:txBody>
+                    <a:bodyPr/>
+                    <a:lstStyle/>
+                    <a:p>
+                      <a:pPr algn="ctr"/>
+                      <a:r>
+                        <a:rPr lang="en-US" dirty="0" smtClean="0"/>
+                        <a:t>17.4</a:t>
+                      </a:r>
+                      <a:endParaRPr lang="en-US" dirty="0"/>
+                    </a:p>
+                  </a:txBody>
+                  <a:tcPr anchor="ctr"/>
+                </a:tc>
+                <a:tc>
+                  <a:txBody>
+                    <a:bodyPr/>
+                    <a:lstStyle/>
+                    <a:p>
+                      <a:pPr algn="ctr"/>
+                      <a:r>
+                        <a:rPr lang="en-US" dirty="0" smtClean="0"/>
+                        <a:t>8.7</a:t>
+                      </a:r>
+                      <a:endParaRPr lang="en-US" dirty="0"/>
+                    </a:p>
+                  </a:txBody>
+                  <a:tcPr anchor="ctr"/>
+                </a:tc>
+              </a:tr>
+            </a:tbl>
+          </a:graphicData>
+        </a:graphic>
+      </p:graphicFrame>
+      <p:sp>
+        <p:nvSpPr>
+          <p:cNvPr id="3" name="TextBox 2"/>
+          <p:cNvSpPr txBox="1"/>
+          <p:nvPr/>
+        </p:nvSpPr>
+        <p:spPr>
+          <a:xfrm>
+            <a:off x="1866569" y="6139934"/>
+            <a:ext cx="5057026" cy="369332"/>
+          </a:xfrm>
+          <a:prstGeom prst="rect">
+            <a:avLst/>
+          </a:prstGeom>
+          <a:noFill/>
+          <a:ln>
+            <a:solidFill>
+              <a:schemeClr val="tx1"/>
+            </a:solidFill>
+          </a:ln>
+        </p:spPr>
+        <p:txBody>
+          <a:bodyPr wrap="none" rtlCol="0">
+            <a:spAutoFit/>
+          </a:bodyPr>
+          <a:lstStyle/>
+          <a:p>
+            <a:pPr algn="ctr"/>
+            <a:r>
+              <a:rPr lang="en-US" dirty="0" smtClean="0"/>
+              <a:t>Assume each MPD word packed on 24 bits = 3 bytes</a:t>
+            </a:r>
+            <a:endParaRPr lang="en-US" dirty="0" smtClean="0"/>
+          </a:p>
+        </p:txBody>
+      </p:sp>
+    </p:spTree>
+    <p:extLst>
+      <p:ext uri="{BB962C8B-B14F-4D97-AF65-F5344CB8AC3E}">
+        <p14:creationId xmlns:p14="http://schemas.microsoft.com/office/powerpoint/2010/main" val="3551906502"/>
+      </p:ext>
+    </p:extLst>
+  </p:cSld>
+  <p:clrMapOvr>
+    <a:masterClrMapping/>
+  </p:clrMapOvr>
+</p:sld>
+</file>
+
 <file path=ppt/slides/slide8.xml><?xml version="1.0" encoding="utf-8"?>
 <p:sld xmlns:a="http://schemas.openxmlformats.org/drawingml/2006/main" xmlns:r="http://schemas.openxmlformats.org/officeDocument/2006/relationships" xmlns:p="http://schemas.openxmlformats.org/presentationml/2006/main">
   <p:cSld>
@@ -13786,7 +13182,7 @@
             <p:ph idx="1"/>
             <p:extLst>
               <p:ext uri="{D42A27DB-BD31-4B8C-83A1-F6EECF244321}">
-                <p14:modId xmlns:p14="http://schemas.microsoft.com/office/powerpoint/2010/main" val="2912529262"/>
+                <p14:modId xmlns:p14="http://schemas.microsoft.com/office/powerpoint/2010/main" val="1206762054"/>
               </p:ext>
             </p:extLst>
           </p:nvPr>
@@ -13898,7 +13294,11 @@
                       <a:pPr algn="ctr"/>
                       <a:r>
                         <a:rPr lang="en-US" dirty="0" smtClean="0"/>
-                        <a:t>100 ns in %</a:t>
+                        <a:t>150 </a:t>
+                      </a:r>
+                      <a:r>
+                        <a:rPr lang="en-US" dirty="0" smtClean="0"/>
+                        <a:t>ns in %</a:t>
                       </a:r>
                       <a:endParaRPr lang="en-US" dirty="0"/>
                     </a:p>
@@ -14053,52 +13453,52 @@
                       <a:pPr algn="ctr"/>
                       <a:r>
                         <a:rPr lang="en-US" dirty="0" smtClean="0"/>
-                        <a:t>42.9</a:t>
-                      </a:r>
-                      <a:endParaRPr lang="en-US" dirty="0"/>
-                    </a:p>
-                  </a:txBody>
-                  <a:tcPr anchor="ctr"/>
-                </a:tc>
-                <a:tc>
-                  <a:txBody>
-                    <a:bodyPr/>
-                    <a:lstStyle/>
-                    <a:p>
-                      <a:pPr algn="ctr"/>
-                      <a:r>
-                        <a:rPr lang="en-US" dirty="0" smtClean="0"/>
-                        <a:t>32800</a:t>
-                      </a:r>
-                      <a:endParaRPr lang="en-US" dirty="0"/>
-                    </a:p>
-                  </a:txBody>
-                  <a:tcPr anchor="ctr"/>
-                </a:tc>
-                <a:tc>
-                  <a:txBody>
-                    <a:bodyPr/>
-                    <a:lstStyle/>
-                    <a:p>
-                      <a:pPr algn="ctr"/>
-                      <a:r>
-                        <a:rPr lang="en-US" dirty="0" smtClean="0"/>
-                        <a:t>393,600</a:t>
-                      </a:r>
-                      <a:endParaRPr lang="en-US" dirty="0"/>
-                    </a:p>
-                  </a:txBody>
-                  <a:tcPr anchor="ctr"/>
-                </a:tc>
-                <a:tc>
-                  <a:txBody>
-                    <a:bodyPr/>
-                    <a:lstStyle/>
-                    <a:p>
-                      <a:pPr algn="ctr"/>
-                      <a:r>
-                        <a:rPr lang="en-US" dirty="0" smtClean="0"/>
-                        <a:t>1968</a:t>
+                        <a:t>17.4</a:t>
+                      </a:r>
+                      <a:endParaRPr lang="en-US" dirty="0"/>
+                    </a:p>
+                  </a:txBody>
+                  <a:tcPr anchor="ctr"/>
+                </a:tc>
+                <a:tc>
+                  <a:txBody>
+                    <a:bodyPr/>
+                    <a:lstStyle/>
+                    <a:p>
+                      <a:pPr algn="ctr"/>
+                      <a:r>
+                        <a:rPr lang="en-US" dirty="0" smtClean="0"/>
+                        <a:t>19680</a:t>
+                      </a:r>
+                      <a:endParaRPr lang="en-US" dirty="0"/>
+                    </a:p>
+                  </a:txBody>
+                  <a:tcPr anchor="ctr"/>
+                </a:tc>
+                <a:tc>
+                  <a:txBody>
+                    <a:bodyPr/>
+                    <a:lstStyle/>
+                    <a:p>
+                      <a:pPr algn="ctr"/>
+                      <a:r>
+                        <a:rPr lang="en-US" dirty="0" smtClean="0"/>
+                        <a:t>359,775</a:t>
+                      </a:r>
+                      <a:endParaRPr lang="en-US" dirty="0"/>
+                    </a:p>
+                  </a:txBody>
+                  <a:tcPr anchor="ctr"/>
+                </a:tc>
+                <a:tc>
+                  <a:txBody>
+                    <a:bodyPr/>
+                    <a:lstStyle/>
+                    <a:p>
+                      <a:pPr algn="ctr"/>
+                      <a:r>
+                        <a:rPr lang="en-US" dirty="0" smtClean="0"/>
+                        <a:t>1798</a:t>
                       </a:r>
                       <a:endParaRPr lang="en-US" dirty="0"/>
                     </a:p>
@@ -14908,7 +14308,7 @@
             <p:ph idx="1"/>
             <p:extLst>
               <p:ext uri="{D42A27DB-BD31-4B8C-83A1-F6EECF244321}">
-                <p14:modId xmlns:p14="http://schemas.microsoft.com/office/powerpoint/2010/main" val="4022445936"/>
+                <p14:modId xmlns:p14="http://schemas.microsoft.com/office/powerpoint/2010/main" val="3083067758"/>
               </p:ext>
             </p:extLst>
           </p:nvPr>
@@ -15175,7 +14575,7 @@
                       <a:pPr algn="ctr"/>
                       <a:r>
                         <a:rPr lang="en-US" dirty="0" smtClean="0"/>
-                        <a:t>4.6</a:t>
+                        <a:t>8.7</a:t>
                       </a:r>
                       <a:endParaRPr lang="en-US" dirty="0"/>
                     </a:p>
@@ -15220,7 +14620,7 @@
                       <a:pPr algn="ctr"/>
                       <a:r>
                         <a:rPr lang="en-US" dirty="0" smtClean="0"/>
-                        <a:t>660</a:t>
+                        <a:t>300</a:t>
                       </a:r>
                       <a:endParaRPr lang="en-US" dirty="0"/>
                     </a:p>
@@ -15952,8 +15352,8 @@
         </p:nvSpPr>
         <p:spPr>
           <a:xfrm>
-            <a:off x="6705600" y="6296167"/>
-            <a:ext cx="2209800" cy="381000"/>
+            <a:off x="5181600" y="6211669"/>
+            <a:ext cx="3733800" cy="369332"/>
           </a:xfrm>
           <a:prstGeom prst="rect">
             <a:avLst/>
@@ -15974,8 +15374,21 @@
             <a:pPr algn="ctr"/>
             <a:r>
               <a:rPr lang="en-US" b="1" dirty="0" smtClean="0"/>
-              <a:t>Total  180.59 MB/s</a:t>
-            </a:r>
+              <a:t>Total  </a:t>
+            </a:r>
+            <a:r>
+              <a:rPr lang="en-US" b="1" dirty="0" smtClean="0"/>
+              <a:t>at 5 KHz </a:t>
+            </a:r>
+            <a:r>
+              <a:rPr lang="en-US" b="1" dirty="0" smtClean="0"/>
+              <a:t>369</a:t>
+            </a:r>
+            <a:r>
+              <a:rPr lang="en-US" b="1" dirty="0" smtClean="0"/>
+              <a:t>.89 MB/s Max</a:t>
+            </a:r>
+            <a:endParaRPr lang="en-US" b="1" dirty="0" smtClean="0"/>
           </a:p>
         </p:txBody>
       </p:sp>

</xml_diff>